<commit_message>
Slides draft and rearranged code
</commit_message>
<xml_diff>
--- a/webinar.pptx
+++ b/webinar.pptx
@@ -5,19 +5,24 @@
     <p:sldMasterId id="2147483684" r:id="rId1"/>
   </p:sldMasterIdLst>
   <p:notesMasterIdLst>
-    <p:notesMasterId r:id="rId12"/>
+    <p:notesMasterId r:id="rId17"/>
   </p:notesMasterIdLst>
   <p:sldIdLst>
-    <p:sldId id="257" r:id="rId2"/>
-    <p:sldId id="258" r:id="rId3"/>
-    <p:sldId id="259" r:id="rId4"/>
-    <p:sldId id="262" r:id="rId5"/>
+    <p:sldId id="268" r:id="rId2"/>
+    <p:sldId id="257" r:id="rId3"/>
+    <p:sldId id="258" r:id="rId4"/>
+    <p:sldId id="259" r:id="rId5"/>
     <p:sldId id="260" r:id="rId6"/>
-    <p:sldId id="263" r:id="rId7"/>
-    <p:sldId id="266" r:id="rId8"/>
+    <p:sldId id="262" r:id="rId7"/>
+    <p:sldId id="263" r:id="rId8"/>
     <p:sldId id="264" r:id="rId9"/>
     <p:sldId id="261" r:id="rId10"/>
-    <p:sldId id="265" r:id="rId11"/>
+    <p:sldId id="266" r:id="rId11"/>
+    <p:sldId id="271" r:id="rId12"/>
+    <p:sldId id="265" r:id="rId13"/>
+    <p:sldId id="269" r:id="rId14"/>
+    <p:sldId id="270" r:id="rId15"/>
+    <p:sldId id="267" r:id="rId16"/>
   </p:sldIdLst>
   <p:sldSz cx="12192000" cy="6858000"/>
   <p:notesSz cx="6858000" cy="9144000"/>
@@ -209,7 +214,7 @@
           <a:p>
             <a:fld id="{D987070D-87AF-4443-8990-425EA27CC244}" type="datetimeFigureOut">
               <a:rPr lang="de-CH" smtClean="0"/>
-              <a:t>22.02.2016</a:t>
+              <a:t>23.02.2016</a:t>
             </a:fld>
             <a:endParaRPr lang="de-CH"/>
           </a:p>
@@ -273,35 +278,35 @@
           <a:p>
             <a:pPr lvl="0"/>
             <a:r>
-              <a:rPr lang="en-US" smtClean="0"/>
+              <a:rPr lang="en-US"/>
               <a:t>Edit Master text styles</a:t>
             </a:r>
           </a:p>
           <a:p>
             <a:pPr lvl="1"/>
             <a:r>
-              <a:rPr lang="en-US" smtClean="0"/>
+              <a:rPr lang="en-US"/>
               <a:t>Second level</a:t>
             </a:r>
           </a:p>
           <a:p>
             <a:pPr lvl="2"/>
             <a:r>
-              <a:rPr lang="en-US" smtClean="0"/>
+              <a:rPr lang="en-US"/>
               <a:t>Third level</a:t>
             </a:r>
           </a:p>
           <a:p>
             <a:pPr lvl="3"/>
             <a:r>
-              <a:rPr lang="en-US" smtClean="0"/>
+              <a:rPr lang="en-US"/>
               <a:t>Fourth level</a:t>
             </a:r>
           </a:p>
           <a:p>
             <a:pPr lvl="4"/>
             <a:r>
-              <a:rPr lang="en-US" smtClean="0"/>
+              <a:rPr lang="en-US"/>
               <a:t>Fifth level</a:t>
             </a:r>
             <a:endParaRPr lang="de-CH"/>
@@ -522,23 +527,23 @@
           <a:lstStyle/>
           <a:p>
             <a:r>
-              <a:rPr lang="de-CH" dirty="0" smtClean="0"/>
+              <a:rPr lang="de-CH" dirty="0"/>
               <a:t>A</a:t>
             </a:r>
             <a:r>
-              <a:rPr lang="de-CH" baseline="0" dirty="0" smtClean="0"/>
+              <a:rPr lang="de-CH" baseline="0" dirty="0"/>
               <a:t> parallel program is one where independent subexpressions are evaluated at the same time on different processors or threads in order to finish computation faster</a:t>
             </a:r>
           </a:p>
           <a:p>
             <a:r>
-              <a:rPr lang="de-CH" baseline="0" dirty="0" smtClean="0"/>
+              <a:rPr lang="de-CH" baseline="0" dirty="0"/>
               <a:t>CPU bound work such as sorting algorithms, filter etc. Is an ideal candidate to be run in parallel. In order to do that sometimes the work has to be split into multiple</a:t>
             </a:r>
           </a:p>
           <a:p>
             <a:r>
-              <a:rPr lang="de-CH" baseline="0" dirty="0" smtClean="0"/>
+              <a:rPr lang="de-CH" baseline="0" dirty="0"/>
               <a:t>Inidivual subwork items</a:t>
             </a:r>
           </a:p>
@@ -564,7 +569,7 @@
           <a:p>
             <a:fld id="{9BCA07FD-5BD5-4529-84B0-48DD2C561176}" type="slidenum">
               <a:rPr lang="de-CH" smtClean="0"/>
-              <a:t>1</a:t>
+              <a:t>2</a:t>
             </a:fld>
             <a:endParaRPr lang="de-CH"/>
           </a:p>
@@ -574,6 +579,362 @@
     <p:extLst>
       <p:ext uri="{BB962C8B-B14F-4D97-AF65-F5344CB8AC3E}">
         <p14:creationId xmlns:p14="http://schemas.microsoft.com/office/powerpoint/2010/main" val="2018069478"/>
+      </p:ext>
+    </p:extLst>
+  </p:cSld>
+  <p:clrMapOvr>
+    <a:masterClrMapping/>
+  </p:clrMapOvr>
+</p:notes>
+</file>
+
+<file path=ppt/notesSlides/notesSlide10.xml><?xml version="1.0" encoding="utf-8"?>
+<p:notes xmlns:a="http://schemas.openxmlformats.org/drawingml/2006/main" xmlns:r="http://schemas.openxmlformats.org/officeDocument/2006/relationships" xmlns:p="http://schemas.openxmlformats.org/presentationml/2006/main">
+  <p:cSld>
+    <p:spTree>
+      <p:nvGrpSpPr>
+        <p:cNvPr id="1" name=""/>
+        <p:cNvGrpSpPr/>
+        <p:nvPr/>
+      </p:nvGrpSpPr>
+      <p:grpSpPr>
+        <a:xfrm>
+          <a:off x="0" y="0"/>
+          <a:ext cx="0" cy="0"/>
+          <a:chOff x="0" y="0"/>
+          <a:chExt cx="0" cy="0"/>
+        </a:xfrm>
+      </p:grpSpPr>
+      <p:sp>
+        <p:nvSpPr>
+          <p:cNvPr id="2" name="Slide Image Placeholder 1"/>
+          <p:cNvSpPr>
+            <a:spLocks noGrp="1" noRot="1" noChangeAspect="1"/>
+          </p:cNvSpPr>
+          <p:nvPr>
+            <p:ph type="sldImg"/>
+          </p:nvPr>
+        </p:nvSpPr>
+        <p:spPr/>
+      </p:sp>
+      <p:sp>
+        <p:nvSpPr>
+          <p:cNvPr id="3" name="Notes Placeholder 2"/>
+          <p:cNvSpPr>
+            <a:spLocks noGrp="1"/>
+          </p:cNvSpPr>
+          <p:nvPr>
+            <p:ph type="body" idx="1"/>
+          </p:nvPr>
+        </p:nvSpPr>
+        <p:spPr/>
+        <p:txBody>
+          <a:bodyPr/>
+          <a:lstStyle/>
+          <a:p>
+            <a:r>
+              <a:rPr lang="en-US" dirty="0" err="1"/>
+              <a:t>Repete</a:t>
+            </a:r>
+            <a:endParaRPr lang="de-CH" dirty="0"/>
+          </a:p>
+        </p:txBody>
+      </p:sp>
+      <p:sp>
+        <p:nvSpPr>
+          <p:cNvPr id="4" name="Slide Number Placeholder 3"/>
+          <p:cNvSpPr>
+            <a:spLocks noGrp="1"/>
+          </p:cNvSpPr>
+          <p:nvPr>
+            <p:ph type="sldNum" sz="quarter" idx="10"/>
+          </p:nvPr>
+        </p:nvSpPr>
+        <p:spPr/>
+        <p:txBody>
+          <a:bodyPr/>
+          <a:lstStyle/>
+          <a:p>
+            <a:fld id="{9BCA07FD-5BD5-4529-84B0-48DD2C561176}" type="slidenum">
+              <a:rPr lang="de-CH" smtClean="0"/>
+              <a:t>11</a:t>
+            </a:fld>
+            <a:endParaRPr lang="de-CH"/>
+          </a:p>
+        </p:txBody>
+      </p:sp>
+    </p:spTree>
+    <p:extLst>
+      <p:ext uri="{BB962C8B-B14F-4D97-AF65-F5344CB8AC3E}">
+        <p14:creationId xmlns:p14="http://schemas.microsoft.com/office/powerpoint/2010/main" val="3613099947"/>
+      </p:ext>
+    </p:extLst>
+  </p:cSld>
+  <p:clrMapOvr>
+    <a:masterClrMapping/>
+  </p:clrMapOvr>
+</p:notes>
+</file>
+
+<file path=ppt/notesSlides/notesSlide11.xml><?xml version="1.0" encoding="utf-8"?>
+<p:notes xmlns:a="http://schemas.openxmlformats.org/drawingml/2006/main" xmlns:r="http://schemas.openxmlformats.org/officeDocument/2006/relationships" xmlns:p="http://schemas.openxmlformats.org/presentationml/2006/main">
+  <p:cSld>
+    <p:spTree>
+      <p:nvGrpSpPr>
+        <p:cNvPr id="1" name=""/>
+        <p:cNvGrpSpPr/>
+        <p:nvPr/>
+      </p:nvGrpSpPr>
+      <p:grpSpPr>
+        <a:xfrm>
+          <a:off x="0" y="0"/>
+          <a:ext cx="0" cy="0"/>
+          <a:chOff x="0" y="0"/>
+          <a:chExt cx="0" cy="0"/>
+        </a:xfrm>
+      </p:grpSpPr>
+      <p:sp>
+        <p:nvSpPr>
+          <p:cNvPr id="2" name="Slide Image Placeholder 1"/>
+          <p:cNvSpPr>
+            <a:spLocks noGrp="1" noRot="1" noChangeAspect="1"/>
+          </p:cNvSpPr>
+          <p:nvPr>
+            <p:ph type="sldImg"/>
+          </p:nvPr>
+        </p:nvSpPr>
+        <p:spPr/>
+      </p:sp>
+      <p:sp>
+        <p:nvSpPr>
+          <p:cNvPr id="3" name="Notes Placeholder 2"/>
+          <p:cNvSpPr>
+            <a:spLocks noGrp="1"/>
+          </p:cNvSpPr>
+          <p:nvPr>
+            <p:ph type="body" idx="1"/>
+          </p:nvPr>
+        </p:nvSpPr>
+        <p:spPr/>
+        <p:txBody>
+          <a:bodyPr/>
+          <a:lstStyle/>
+          <a:p>
+            <a:r>
+              <a:rPr lang="de-CH" dirty="0"/>
+              <a:t>Reduces christmas tree programming to code</a:t>
+            </a:r>
+            <a:r>
+              <a:rPr lang="de-CH" baseline="0" dirty="0"/>
+              <a:t> which looks much</a:t>
+            </a:r>
+            <a:endParaRPr lang="de-CH" dirty="0"/>
+          </a:p>
+        </p:txBody>
+      </p:sp>
+      <p:sp>
+        <p:nvSpPr>
+          <p:cNvPr id="4" name="Slide Number Placeholder 3"/>
+          <p:cNvSpPr>
+            <a:spLocks noGrp="1"/>
+          </p:cNvSpPr>
+          <p:nvPr>
+            <p:ph type="sldNum" sz="quarter" idx="10"/>
+          </p:nvPr>
+        </p:nvSpPr>
+        <p:spPr/>
+        <p:txBody>
+          <a:bodyPr/>
+          <a:lstStyle/>
+          <a:p>
+            <a:fld id="{9BCA07FD-5BD5-4529-84B0-48DD2C561176}" type="slidenum">
+              <a:rPr lang="de-CH" smtClean="0"/>
+              <a:t>13</a:t>
+            </a:fld>
+            <a:endParaRPr lang="de-CH"/>
+          </a:p>
+        </p:txBody>
+      </p:sp>
+    </p:spTree>
+    <p:extLst>
+      <p:ext uri="{BB962C8B-B14F-4D97-AF65-F5344CB8AC3E}">
+        <p14:creationId xmlns:p14="http://schemas.microsoft.com/office/powerpoint/2010/main" val="2069520698"/>
+      </p:ext>
+    </p:extLst>
+  </p:cSld>
+  <p:clrMapOvr>
+    <a:masterClrMapping/>
+  </p:clrMapOvr>
+</p:notes>
+</file>
+
+<file path=ppt/notesSlides/notesSlide12.xml><?xml version="1.0" encoding="utf-8"?>
+<p:notes xmlns:a="http://schemas.openxmlformats.org/drawingml/2006/main" xmlns:r="http://schemas.openxmlformats.org/officeDocument/2006/relationships" xmlns:p="http://schemas.openxmlformats.org/presentationml/2006/main">
+  <p:cSld>
+    <p:spTree>
+      <p:nvGrpSpPr>
+        <p:cNvPr id="1" name=""/>
+        <p:cNvGrpSpPr/>
+        <p:nvPr/>
+      </p:nvGrpSpPr>
+      <p:grpSpPr>
+        <a:xfrm>
+          <a:off x="0" y="0"/>
+          <a:ext cx="0" cy="0"/>
+          <a:chOff x="0" y="0"/>
+          <a:chExt cx="0" cy="0"/>
+        </a:xfrm>
+      </p:grpSpPr>
+      <p:sp>
+        <p:nvSpPr>
+          <p:cNvPr id="2" name="Slide Image Placeholder 1"/>
+          <p:cNvSpPr>
+            <a:spLocks noGrp="1" noRot="1" noChangeAspect="1"/>
+          </p:cNvSpPr>
+          <p:nvPr>
+            <p:ph type="sldImg"/>
+          </p:nvPr>
+        </p:nvSpPr>
+        <p:spPr/>
+      </p:sp>
+      <p:sp>
+        <p:nvSpPr>
+          <p:cNvPr id="3" name="Notes Placeholder 2"/>
+          <p:cNvSpPr>
+            <a:spLocks noGrp="1"/>
+          </p:cNvSpPr>
+          <p:nvPr>
+            <p:ph type="body" idx="1"/>
+          </p:nvPr>
+        </p:nvSpPr>
+        <p:spPr/>
+        <p:txBody>
+          <a:bodyPr/>
+          <a:lstStyle/>
+          <a:p>
+            <a:r>
+              <a:rPr lang="en-US" dirty="0"/>
+              <a:t>Recap</a:t>
+            </a:r>
+            <a:endParaRPr lang="de-CH" dirty="0"/>
+          </a:p>
+        </p:txBody>
+      </p:sp>
+      <p:sp>
+        <p:nvSpPr>
+          <p:cNvPr id="4" name="Slide Number Placeholder 3"/>
+          <p:cNvSpPr>
+            <a:spLocks noGrp="1"/>
+          </p:cNvSpPr>
+          <p:nvPr>
+            <p:ph type="sldNum" sz="quarter" idx="10"/>
+          </p:nvPr>
+        </p:nvSpPr>
+        <p:spPr/>
+        <p:txBody>
+          <a:bodyPr/>
+          <a:lstStyle/>
+          <a:p>
+            <a:fld id="{9BCA07FD-5BD5-4529-84B0-48DD2C561176}" type="slidenum">
+              <a:rPr lang="de-CH" smtClean="0"/>
+              <a:t>14</a:t>
+            </a:fld>
+            <a:endParaRPr lang="de-CH"/>
+          </a:p>
+        </p:txBody>
+      </p:sp>
+    </p:spTree>
+    <p:extLst>
+      <p:ext uri="{BB962C8B-B14F-4D97-AF65-F5344CB8AC3E}">
+        <p14:creationId xmlns:p14="http://schemas.microsoft.com/office/powerpoint/2010/main" val="3499258299"/>
+      </p:ext>
+    </p:extLst>
+  </p:cSld>
+  <p:clrMapOvr>
+    <a:masterClrMapping/>
+  </p:clrMapOvr>
+</p:notes>
+</file>
+
+<file path=ppt/notesSlides/notesSlide13.xml><?xml version="1.0" encoding="utf-8"?>
+<p:notes xmlns:a="http://schemas.openxmlformats.org/drawingml/2006/main" xmlns:r="http://schemas.openxmlformats.org/officeDocument/2006/relationships" xmlns:p="http://schemas.openxmlformats.org/presentationml/2006/main">
+  <p:cSld>
+    <p:spTree>
+      <p:nvGrpSpPr>
+        <p:cNvPr id="1" name=""/>
+        <p:cNvGrpSpPr/>
+        <p:nvPr/>
+      </p:nvGrpSpPr>
+      <p:grpSpPr>
+        <a:xfrm>
+          <a:off x="0" y="0"/>
+          <a:ext cx="0" cy="0"/>
+          <a:chOff x="0" y="0"/>
+          <a:chExt cx="0" cy="0"/>
+        </a:xfrm>
+      </p:grpSpPr>
+      <p:sp>
+        <p:nvSpPr>
+          <p:cNvPr id="2" name="Slide Image Placeholder 1"/>
+          <p:cNvSpPr>
+            <a:spLocks noGrp="1" noRot="1" noChangeAspect="1"/>
+          </p:cNvSpPr>
+          <p:nvPr>
+            <p:ph type="sldImg"/>
+          </p:nvPr>
+        </p:nvSpPr>
+        <p:spPr/>
+      </p:sp>
+      <p:sp>
+        <p:nvSpPr>
+          <p:cNvPr id="3" name="Notes Placeholder 2"/>
+          <p:cNvSpPr>
+            <a:spLocks noGrp="1"/>
+          </p:cNvSpPr>
+          <p:nvPr>
+            <p:ph type="body" idx="1"/>
+          </p:nvPr>
+        </p:nvSpPr>
+        <p:spPr/>
+        <p:txBody>
+          <a:bodyPr/>
+          <a:lstStyle/>
+          <a:p>
+            <a:r>
+              <a:rPr lang="en-US" dirty="0"/>
+              <a:t>Questions that can be answered in blog posts</a:t>
+            </a:r>
+            <a:endParaRPr lang="de-CH" dirty="0"/>
+          </a:p>
+        </p:txBody>
+      </p:sp>
+      <p:sp>
+        <p:nvSpPr>
+          <p:cNvPr id="4" name="Slide Number Placeholder 3"/>
+          <p:cNvSpPr>
+            <a:spLocks noGrp="1"/>
+          </p:cNvSpPr>
+          <p:nvPr>
+            <p:ph type="sldNum" sz="quarter" idx="10"/>
+          </p:nvPr>
+        </p:nvSpPr>
+        <p:spPr/>
+        <p:txBody>
+          <a:bodyPr/>
+          <a:lstStyle/>
+          <a:p>
+            <a:fld id="{9BCA07FD-5BD5-4529-84B0-48DD2C561176}" type="slidenum">
+              <a:rPr lang="de-CH" smtClean="0"/>
+              <a:t>15</a:t>
+            </a:fld>
+            <a:endParaRPr lang="de-CH"/>
+          </a:p>
+        </p:txBody>
+      </p:sp>
+    </p:spTree>
+    <p:extLst>
+      <p:ext uri="{BB962C8B-B14F-4D97-AF65-F5344CB8AC3E}">
+        <p14:creationId xmlns:p14="http://schemas.microsoft.com/office/powerpoint/2010/main" val="3670487613"/>
       </p:ext>
     </p:extLst>
   </p:cSld>
@@ -628,14 +989,45 @@
           <a:lstStyle/>
           <a:p>
             <a:r>
-              <a:rPr lang="de-CH" dirty="0" smtClean="0"/>
+              <a:rPr lang="de-CH" dirty="0"/>
               <a:t>It is important to note that concurrent programs might be run on just one processor using an interleaving scheduler and they are still just as concurrent as ones that are run on multiple processors</a:t>
             </a:r>
           </a:p>
           <a:p>
             <a:r>
-              <a:rPr lang="de-CH" dirty="0" smtClean="0"/>
+              <a:rPr lang="de-CH" dirty="0"/>
               <a:t>Parallel computation is not a special case of concurrency. One can achieve parallelism using concurrency constructs</a:t>
+            </a:r>
+          </a:p>
+          <a:p>
+            <a:endParaRPr lang="en-US" dirty="0"/>
+          </a:p>
+          <a:p>
+            <a:r>
+              <a:rPr lang="en-US" dirty="0"/>
+              <a:t>Benefit of concurrent vs. thread?</a:t>
+            </a:r>
+          </a:p>
+          <a:p>
+            <a:r>
+              <a:rPr lang="en-US" dirty="0" err="1"/>
+              <a:t>Rampup</a:t>
+            </a:r>
+            <a:r>
+              <a:rPr lang="en-US" dirty="0"/>
+              <a:t> of </a:t>
+            </a:r>
+            <a:r>
+              <a:rPr lang="en-US" dirty="0" err="1"/>
+              <a:t>threadPool</a:t>
+            </a:r>
+            <a:r>
+              <a:rPr lang="en-US" dirty="0"/>
+              <a:t>,</a:t>
+            </a:r>
+            <a:r>
+              <a:rPr lang="en-US" baseline="0" dirty="0"/>
+              <a:t> resource usage…</a:t>
             </a:r>
             <a:endParaRPr lang="de-CH" dirty="0"/>
           </a:p>
@@ -658,7 +1050,7 @@
           <a:p>
             <a:fld id="{9BCA07FD-5BD5-4529-84B0-48DD2C561176}" type="slidenum">
               <a:rPr lang="de-CH" smtClean="0"/>
-              <a:t>2</a:t>
+              <a:t>3</a:t>
             </a:fld>
             <a:endParaRPr lang="de-CH"/>
           </a:p>
@@ -722,23 +1114,23 @@
           <a:lstStyle/>
           <a:p>
             <a:r>
-              <a:rPr lang="de-CH" dirty="0" smtClean="0"/>
+              <a:rPr lang="de-CH" dirty="0"/>
               <a:t>Asynchronous</a:t>
             </a:r>
             <a:r>
-              <a:rPr lang="de-CH" baseline="0" dirty="0" smtClean="0"/>
+              <a:rPr lang="de-CH" baseline="0" dirty="0"/>
               <a:t> program dispatches tasks to devices that can take care of themselves, leaving the program free to do something else until it receives a signal that the results are finished</a:t>
             </a:r>
           </a:p>
           <a:p>
             <a:r>
-              <a:rPr lang="de-CH" baseline="0" dirty="0" smtClean="0"/>
+              <a:rPr lang="de-CH" baseline="0" dirty="0"/>
               <a:t>Asynchronous programming should be used for external operations which support reactive or event-driven callbacks when they are done. Usually that is the case for IO-bound work. </a:t>
             </a:r>
           </a:p>
           <a:p>
             <a:r>
-              <a:rPr lang="de-CH" baseline="0" dirty="0" smtClean="0"/>
+              <a:rPr lang="de-CH" baseline="0" dirty="0"/>
               <a:t>For example on windows IOCompletionPorts signal the result of a IO operation back to the initiator of the operation</a:t>
             </a:r>
             <a:endParaRPr lang="de-CH" dirty="0"/>
@@ -762,7 +1154,7 @@
           <a:p>
             <a:fld id="{9BCA07FD-5BD5-4529-84B0-48DD2C561176}" type="slidenum">
               <a:rPr lang="de-CH" smtClean="0"/>
-              <a:t>3</a:t>
+              <a:t>4</a:t>
             </a:fld>
             <a:endParaRPr lang="de-CH"/>
           </a:p>
@@ -826,12 +1218,21 @@
           <a:lstStyle/>
           <a:p>
             <a:r>
-              <a:rPr lang="de-CH" dirty="0" smtClean="0"/>
+              <a:rPr lang="de-CH" dirty="0"/>
               <a:t>It is an abstraction layer which represents both CPU bound and IO-bound operations as a uniformed</a:t>
             </a:r>
             <a:r>
-              <a:rPr lang="de-CH" baseline="0" dirty="0" smtClean="0"/>
+              <a:rPr lang="de-CH" baseline="0" dirty="0"/>
               <a:t> API</a:t>
+            </a:r>
+          </a:p>
+          <a:p>
+            <a:endParaRPr lang="en-US" baseline="0" dirty="0"/>
+          </a:p>
+          <a:p>
+            <a:r>
+              <a:rPr lang="en-US" baseline="0" dirty="0"/>
+              <a:t>Tie back to laundry machine</a:t>
             </a:r>
             <a:endParaRPr lang="de-CH" dirty="0"/>
           </a:p>
@@ -917,14 +1318,6 @@
           <a:bodyPr/>
           <a:lstStyle/>
           <a:p>
-            <a:r>
-              <a:rPr lang="de-CH" dirty="0" smtClean="0"/>
-              <a:t>It is an abstraction layer which represents both CPU bound and IO-bound operations as a uniformed</a:t>
-            </a:r>
-            <a:r>
-              <a:rPr lang="de-CH" baseline="0" dirty="0" smtClean="0"/>
-              <a:t> API</a:t>
-            </a:r>
             <a:endParaRPr lang="de-CH" dirty="0"/>
           </a:p>
         </p:txBody>
@@ -955,7 +1348,7 @@
     </p:spTree>
     <p:extLst>
       <p:ext uri="{BB962C8B-B14F-4D97-AF65-F5344CB8AC3E}">
-        <p14:creationId xmlns:p14="http://schemas.microsoft.com/office/powerpoint/2010/main" val="2124993988"/>
+        <p14:creationId xmlns:p14="http://schemas.microsoft.com/office/powerpoint/2010/main" val="232034041"/>
       </p:ext>
     </p:extLst>
   </p:cSld>
@@ -1010,14 +1403,19 @@
           <a:lstStyle/>
           <a:p>
             <a:r>
-              <a:rPr lang="de-CH" dirty="0" smtClean="0"/>
-              <a:t>Reduces christmas tree programming to code</a:t>
-            </a:r>
-            <a:r>
-              <a:rPr lang="de-CH" baseline="0" dirty="0" smtClean="0"/>
-              <a:t> which looks much</a:t>
-            </a:r>
-            <a:endParaRPr lang="de-CH" dirty="0"/>
+              <a:rPr lang="en-US" dirty="0"/>
+              <a:t>Leaving the thread management to someone</a:t>
+            </a:r>
+            <a:r>
+              <a:rPr lang="en-US" baseline="0" dirty="0"/>
+              <a:t> who knows better</a:t>
+            </a:r>
+          </a:p>
+          <a:p>
+            <a:r>
+              <a:rPr lang="en-US" baseline="0" dirty="0"/>
+              <a:t>Leave it to the professionals</a:t>
+            </a:r>
           </a:p>
         </p:txBody>
       </p:sp>
@@ -1047,7 +1445,7 @@
     </p:spTree>
     <p:extLst>
       <p:ext uri="{BB962C8B-B14F-4D97-AF65-F5344CB8AC3E}">
-        <p14:creationId xmlns:p14="http://schemas.microsoft.com/office/powerpoint/2010/main" val="352860002"/>
+        <p14:creationId xmlns:p14="http://schemas.microsoft.com/office/powerpoint/2010/main" val="2124993988"/>
       </p:ext>
     </p:extLst>
   </p:cSld>
@@ -1102,12 +1500,21 @@
           <a:lstStyle/>
           <a:p>
             <a:r>
-              <a:rPr lang="de-CH" dirty="0" smtClean="0"/>
+              <a:rPr lang="de-CH" dirty="0"/>
               <a:t>It is an abstraction layer which represents both CPU bound and IO-bound operations as a uniformed</a:t>
             </a:r>
             <a:r>
-              <a:rPr lang="de-CH" baseline="0" dirty="0" smtClean="0"/>
+              <a:rPr lang="de-CH" baseline="0" dirty="0"/>
               <a:t> API</a:t>
+            </a:r>
+          </a:p>
+          <a:p>
+            <a:endParaRPr lang="en-US" baseline="0" dirty="0"/>
+          </a:p>
+          <a:p>
+            <a:r>
+              <a:rPr lang="en-US" baseline="0" dirty="0"/>
+              <a:t>ANT THE SEDENT</a:t>
             </a:r>
             <a:endParaRPr lang="de-CH" dirty="0"/>
           </a:p>
@@ -1140,6 +1547,182 @@
     <p:extLst>
       <p:ext uri="{BB962C8B-B14F-4D97-AF65-F5344CB8AC3E}">
         <p14:creationId xmlns:p14="http://schemas.microsoft.com/office/powerpoint/2010/main" val="3536785060"/>
+      </p:ext>
+    </p:extLst>
+  </p:cSld>
+  <p:clrMapOvr>
+    <a:masterClrMapping/>
+  </p:clrMapOvr>
+</p:notes>
+</file>
+
+<file path=ppt/notesSlides/notesSlide8.xml><?xml version="1.0" encoding="utf-8"?>
+<p:notes xmlns:a="http://schemas.openxmlformats.org/drawingml/2006/main" xmlns:r="http://schemas.openxmlformats.org/officeDocument/2006/relationships" xmlns:p="http://schemas.openxmlformats.org/presentationml/2006/main">
+  <p:cSld>
+    <p:spTree>
+      <p:nvGrpSpPr>
+        <p:cNvPr id="1" name=""/>
+        <p:cNvGrpSpPr/>
+        <p:nvPr/>
+      </p:nvGrpSpPr>
+      <p:grpSpPr>
+        <a:xfrm>
+          <a:off x="0" y="0"/>
+          <a:ext cx="0" cy="0"/>
+          <a:chOff x="0" y="0"/>
+          <a:chExt cx="0" cy="0"/>
+        </a:xfrm>
+      </p:grpSpPr>
+      <p:sp>
+        <p:nvSpPr>
+          <p:cNvPr id="2" name="Slide Image Placeholder 1"/>
+          <p:cNvSpPr>
+            <a:spLocks noGrp="1" noRot="1" noChangeAspect="1"/>
+          </p:cNvSpPr>
+          <p:nvPr>
+            <p:ph type="sldImg"/>
+          </p:nvPr>
+        </p:nvSpPr>
+        <p:spPr/>
+      </p:sp>
+      <p:sp>
+        <p:nvSpPr>
+          <p:cNvPr id="3" name="Notes Placeholder 2"/>
+          <p:cNvSpPr>
+            <a:spLocks noGrp="1"/>
+          </p:cNvSpPr>
+          <p:nvPr>
+            <p:ph type="body" idx="1"/>
+          </p:nvPr>
+        </p:nvSpPr>
+        <p:spPr/>
+        <p:txBody>
+          <a:bodyPr/>
+          <a:lstStyle/>
+          <a:p>
+            <a:endParaRPr lang="de-CH" dirty="0"/>
+          </a:p>
+        </p:txBody>
+      </p:sp>
+      <p:sp>
+        <p:nvSpPr>
+          <p:cNvPr id="4" name="Slide Number Placeholder 3"/>
+          <p:cNvSpPr>
+            <a:spLocks noGrp="1"/>
+          </p:cNvSpPr>
+          <p:nvPr>
+            <p:ph type="sldNum" sz="quarter" idx="10"/>
+          </p:nvPr>
+        </p:nvSpPr>
+        <p:spPr/>
+        <p:txBody>
+          <a:bodyPr/>
+          <a:lstStyle/>
+          <a:p>
+            <a:fld id="{9BCA07FD-5BD5-4529-84B0-48DD2C561176}" type="slidenum">
+              <a:rPr lang="de-CH" smtClean="0"/>
+              <a:t>9</a:t>
+            </a:fld>
+            <a:endParaRPr lang="de-CH"/>
+          </a:p>
+        </p:txBody>
+      </p:sp>
+    </p:spTree>
+    <p:extLst>
+      <p:ext uri="{BB962C8B-B14F-4D97-AF65-F5344CB8AC3E}">
+        <p14:creationId xmlns:p14="http://schemas.microsoft.com/office/powerpoint/2010/main" val="586993537"/>
+      </p:ext>
+    </p:extLst>
+  </p:cSld>
+  <p:clrMapOvr>
+    <a:masterClrMapping/>
+  </p:clrMapOvr>
+</p:notes>
+</file>
+
+<file path=ppt/notesSlides/notesSlide9.xml><?xml version="1.0" encoding="utf-8"?>
+<p:notes xmlns:a="http://schemas.openxmlformats.org/drawingml/2006/main" xmlns:r="http://schemas.openxmlformats.org/officeDocument/2006/relationships" xmlns:p="http://schemas.openxmlformats.org/presentationml/2006/main">
+  <p:cSld>
+    <p:spTree>
+      <p:nvGrpSpPr>
+        <p:cNvPr id="1" name=""/>
+        <p:cNvGrpSpPr/>
+        <p:nvPr/>
+      </p:nvGrpSpPr>
+      <p:grpSpPr>
+        <a:xfrm>
+          <a:off x="0" y="0"/>
+          <a:ext cx="0" cy="0"/>
+          <a:chOff x="0" y="0"/>
+          <a:chExt cx="0" cy="0"/>
+        </a:xfrm>
+      </p:grpSpPr>
+      <p:sp>
+        <p:nvSpPr>
+          <p:cNvPr id="2" name="Slide Image Placeholder 1"/>
+          <p:cNvSpPr>
+            <a:spLocks noGrp="1" noRot="1" noChangeAspect="1"/>
+          </p:cNvSpPr>
+          <p:nvPr>
+            <p:ph type="sldImg"/>
+          </p:nvPr>
+        </p:nvSpPr>
+        <p:spPr/>
+      </p:sp>
+      <p:sp>
+        <p:nvSpPr>
+          <p:cNvPr id="3" name="Notes Placeholder 2"/>
+          <p:cNvSpPr>
+            <a:spLocks noGrp="1"/>
+          </p:cNvSpPr>
+          <p:nvPr>
+            <p:ph type="body" idx="1"/>
+          </p:nvPr>
+        </p:nvSpPr>
+        <p:spPr/>
+        <p:txBody>
+          <a:bodyPr/>
+          <a:lstStyle/>
+          <a:p>
+            <a:r>
+              <a:rPr lang="de-CH" dirty="0"/>
+              <a:t>Reduces christmas tree programming to code</a:t>
+            </a:r>
+            <a:r>
+              <a:rPr lang="de-CH" baseline="0" dirty="0"/>
+              <a:t> which looks much</a:t>
+            </a:r>
+            <a:endParaRPr lang="de-CH" dirty="0"/>
+          </a:p>
+        </p:txBody>
+      </p:sp>
+      <p:sp>
+        <p:nvSpPr>
+          <p:cNvPr id="4" name="Slide Number Placeholder 3"/>
+          <p:cNvSpPr>
+            <a:spLocks noGrp="1"/>
+          </p:cNvSpPr>
+          <p:nvPr>
+            <p:ph type="sldNum" sz="quarter" idx="10"/>
+          </p:nvPr>
+        </p:nvSpPr>
+        <p:spPr/>
+        <p:txBody>
+          <a:bodyPr/>
+          <a:lstStyle/>
+          <a:p>
+            <a:fld id="{9BCA07FD-5BD5-4529-84B0-48DD2C561176}" type="slidenum">
+              <a:rPr lang="de-CH" smtClean="0"/>
+              <a:t>10</a:t>
+            </a:fld>
+            <a:endParaRPr lang="de-CH"/>
+          </a:p>
+        </p:txBody>
+      </p:sp>
+    </p:spTree>
+    <p:extLst>
+      <p:ext uri="{BB962C8B-B14F-4D97-AF65-F5344CB8AC3E}">
+        <p14:creationId xmlns:p14="http://schemas.microsoft.com/office/powerpoint/2010/main" val="352860002"/>
       </p:ext>
     </p:extLst>
   </p:cSld>
@@ -1191,7 +1774,7 @@
           </a:lstStyle>
           <a:p>
             <a:r>
-              <a:rPr lang="en-US" smtClean="0"/>
+              <a:rPr lang="en-US"/>
               <a:t>Click to edit Master title style</a:t>
             </a:r>
             <a:endParaRPr lang="en-US" dirty="0"/>
@@ -1256,7 +1839,7 @@
           </a:lstStyle>
           <a:p>
             <a:r>
-              <a:rPr lang="en-US" smtClean="0"/>
+              <a:rPr lang="en-US"/>
               <a:t>Click to edit Master subtitle style</a:t>
             </a:r>
             <a:endParaRPr lang="en-US" dirty="0"/>
@@ -1280,7 +1863,7 @@
           <a:p>
             <a:fld id="{A2EAEABE-1D59-4413-813E-803E21872067}" type="datetimeFigureOut">
               <a:rPr lang="de-CH" smtClean="0"/>
-              <a:t>22.02.2016</a:t>
+              <a:t>23.02.2016</a:t>
             </a:fld>
             <a:endParaRPr lang="de-CH"/>
           </a:p>
@@ -1374,7 +1957,7 @@
           <a:lstStyle/>
           <a:p>
             <a:r>
-              <a:rPr lang="en-US" smtClean="0"/>
+              <a:rPr lang="en-US"/>
               <a:t>Click to edit Master title style</a:t>
             </a:r>
             <a:endParaRPr lang="en-US" dirty="0"/>
@@ -1398,35 +1981,35 @@
           <a:p>
             <a:pPr lvl="0"/>
             <a:r>
-              <a:rPr lang="en-US" smtClean="0"/>
+              <a:rPr lang="en-US"/>
               <a:t>Edit Master text styles</a:t>
             </a:r>
           </a:p>
           <a:p>
             <a:pPr lvl="1"/>
             <a:r>
-              <a:rPr lang="en-US" smtClean="0"/>
+              <a:rPr lang="en-US"/>
               <a:t>Second level</a:t>
             </a:r>
           </a:p>
           <a:p>
             <a:pPr lvl="2"/>
             <a:r>
-              <a:rPr lang="en-US" smtClean="0"/>
+              <a:rPr lang="en-US"/>
               <a:t>Third level</a:t>
             </a:r>
           </a:p>
           <a:p>
             <a:pPr lvl="3"/>
             <a:r>
-              <a:rPr lang="en-US" smtClean="0"/>
+              <a:rPr lang="en-US"/>
               <a:t>Fourth level</a:t>
             </a:r>
           </a:p>
           <a:p>
             <a:pPr lvl="4"/>
             <a:r>
-              <a:rPr lang="en-US" smtClean="0"/>
+              <a:rPr lang="en-US"/>
               <a:t>Fifth level</a:t>
             </a:r>
             <a:endParaRPr lang="en-US" dirty="0"/>
@@ -1450,7 +2033,7 @@
           <a:p>
             <a:fld id="{A2EAEABE-1D59-4413-813E-803E21872067}" type="datetimeFigureOut">
               <a:rPr lang="de-CH" smtClean="0"/>
-              <a:t>22.02.2016</a:t>
+              <a:t>23.02.2016</a:t>
             </a:fld>
             <a:endParaRPr lang="de-CH"/>
           </a:p>
@@ -1549,7 +2132,7 @@
           <a:lstStyle/>
           <a:p>
             <a:r>
-              <a:rPr lang="en-US" smtClean="0"/>
+              <a:rPr lang="en-US"/>
               <a:t>Click to edit Master title style</a:t>
             </a:r>
             <a:endParaRPr lang="en-US" dirty="0"/>
@@ -1578,35 +2161,35 @@
           <a:p>
             <a:pPr lvl="0"/>
             <a:r>
-              <a:rPr lang="en-US" smtClean="0"/>
+              <a:rPr lang="en-US"/>
               <a:t>Edit Master text styles</a:t>
             </a:r>
           </a:p>
           <a:p>
             <a:pPr lvl="1"/>
             <a:r>
-              <a:rPr lang="en-US" smtClean="0"/>
+              <a:rPr lang="en-US"/>
               <a:t>Second level</a:t>
             </a:r>
           </a:p>
           <a:p>
             <a:pPr lvl="2"/>
             <a:r>
-              <a:rPr lang="en-US" smtClean="0"/>
+              <a:rPr lang="en-US"/>
               <a:t>Third level</a:t>
             </a:r>
           </a:p>
           <a:p>
             <a:pPr lvl="3"/>
             <a:r>
-              <a:rPr lang="en-US" smtClean="0"/>
+              <a:rPr lang="en-US"/>
               <a:t>Fourth level</a:t>
             </a:r>
           </a:p>
           <a:p>
             <a:pPr lvl="4"/>
             <a:r>
-              <a:rPr lang="en-US" smtClean="0"/>
+              <a:rPr lang="en-US"/>
               <a:t>Fifth level</a:t>
             </a:r>
             <a:endParaRPr lang="en-US" dirty="0"/>
@@ -1630,7 +2213,7 @@
           <a:p>
             <a:fld id="{A2EAEABE-1D59-4413-813E-803E21872067}" type="datetimeFigureOut">
               <a:rPr lang="de-CH" smtClean="0"/>
-              <a:t>22.02.2016</a:t>
+              <a:t>23.02.2016</a:t>
             </a:fld>
             <a:endParaRPr lang="de-CH"/>
           </a:p>
@@ -1724,7 +2307,7 @@
           <a:lstStyle/>
           <a:p>
             <a:r>
-              <a:rPr lang="en-US" smtClean="0"/>
+              <a:rPr lang="en-US"/>
               <a:t>Click to edit Master title style</a:t>
             </a:r>
             <a:endParaRPr lang="en-US" dirty="0"/>
@@ -1748,38 +2331,37 @@
           <a:p>
             <a:pPr lvl="0"/>
             <a:r>
-              <a:rPr lang="en-US" dirty="0" smtClean="0"/>
+              <a:rPr lang="en-US" dirty="0"/>
               <a:t>Edit Master text styles</a:t>
             </a:r>
           </a:p>
           <a:p>
             <a:pPr lvl="1"/>
             <a:r>
-              <a:rPr lang="en-US" dirty="0" smtClean="0"/>
+              <a:rPr lang="en-US" dirty="0"/>
               <a:t>Second level</a:t>
             </a:r>
           </a:p>
           <a:p>
             <a:pPr lvl="2"/>
             <a:r>
-              <a:rPr lang="en-US" dirty="0" smtClean="0"/>
+              <a:rPr lang="en-US" dirty="0"/>
               <a:t>Third level</a:t>
             </a:r>
           </a:p>
           <a:p>
             <a:pPr lvl="3"/>
             <a:r>
-              <a:rPr lang="en-US" dirty="0" smtClean="0"/>
+              <a:rPr lang="en-US" dirty="0"/>
               <a:t>Fourth level</a:t>
             </a:r>
           </a:p>
           <a:p>
             <a:pPr lvl="4"/>
             <a:r>
-              <a:rPr lang="en-US" dirty="0" smtClean="0"/>
+              <a:rPr lang="en-US" dirty="0"/>
               <a:t>Fifth level</a:t>
             </a:r>
-            <a:endParaRPr lang="en-US" dirty="0"/>
           </a:p>
         </p:txBody>
       </p:sp>
@@ -1800,7 +2382,7 @@
           <a:p>
             <a:fld id="{A2EAEABE-1D59-4413-813E-803E21872067}" type="datetimeFigureOut">
               <a:rPr lang="de-CH" smtClean="0"/>
-              <a:t>22.02.2016</a:t>
+              <a:t>23.02.2016</a:t>
             </a:fld>
             <a:endParaRPr lang="de-CH"/>
           </a:p>
@@ -1903,7 +2485,7 @@
           </a:lstStyle>
           <a:p>
             <a:r>
-              <a:rPr lang="en-US" smtClean="0"/>
+              <a:rPr lang="en-US"/>
               <a:t>Click to edit Master title style</a:t>
             </a:r>
             <a:endParaRPr lang="en-US" dirty="0"/>
@@ -2023,7 +2605,7 @@
           <a:p>
             <a:pPr lvl="0"/>
             <a:r>
-              <a:rPr lang="en-US" smtClean="0"/>
+              <a:rPr lang="en-US"/>
               <a:t>Edit Master text styles</a:t>
             </a:r>
           </a:p>
@@ -2046,7 +2628,7 @@
           <a:p>
             <a:fld id="{A2EAEABE-1D59-4413-813E-803E21872067}" type="datetimeFigureOut">
               <a:rPr lang="de-CH" smtClean="0"/>
-              <a:t>22.02.2016</a:t>
+              <a:t>23.02.2016</a:t>
             </a:fld>
             <a:endParaRPr lang="de-CH"/>
           </a:p>
@@ -2140,7 +2722,7 @@
           <a:lstStyle/>
           <a:p>
             <a:r>
-              <a:rPr lang="en-US" smtClean="0"/>
+              <a:rPr lang="en-US"/>
               <a:t>Click to edit Master title style</a:t>
             </a:r>
             <a:endParaRPr lang="en-US" dirty="0"/>
@@ -2169,35 +2751,35 @@
           <a:p>
             <a:pPr lvl="0"/>
             <a:r>
-              <a:rPr lang="en-US" smtClean="0"/>
+              <a:rPr lang="en-US"/>
               <a:t>Edit Master text styles</a:t>
             </a:r>
           </a:p>
           <a:p>
             <a:pPr lvl="1"/>
             <a:r>
-              <a:rPr lang="en-US" smtClean="0"/>
+              <a:rPr lang="en-US"/>
               <a:t>Second level</a:t>
             </a:r>
           </a:p>
           <a:p>
             <a:pPr lvl="2"/>
             <a:r>
-              <a:rPr lang="en-US" smtClean="0"/>
+              <a:rPr lang="en-US"/>
               <a:t>Third level</a:t>
             </a:r>
           </a:p>
           <a:p>
             <a:pPr lvl="3"/>
             <a:r>
-              <a:rPr lang="en-US" smtClean="0"/>
+              <a:rPr lang="en-US"/>
               <a:t>Fourth level</a:t>
             </a:r>
           </a:p>
           <a:p>
             <a:pPr lvl="4"/>
             <a:r>
-              <a:rPr lang="en-US" smtClean="0"/>
+              <a:rPr lang="en-US"/>
               <a:t>Fifth level</a:t>
             </a:r>
             <a:endParaRPr lang="en-US" dirty="0"/>
@@ -2226,35 +2808,35 @@
           <a:p>
             <a:pPr lvl="0"/>
             <a:r>
-              <a:rPr lang="en-US" smtClean="0"/>
+              <a:rPr lang="en-US"/>
               <a:t>Edit Master text styles</a:t>
             </a:r>
           </a:p>
           <a:p>
             <a:pPr lvl="1"/>
             <a:r>
-              <a:rPr lang="en-US" smtClean="0"/>
+              <a:rPr lang="en-US"/>
               <a:t>Second level</a:t>
             </a:r>
           </a:p>
           <a:p>
             <a:pPr lvl="2"/>
             <a:r>
-              <a:rPr lang="en-US" smtClean="0"/>
+              <a:rPr lang="en-US"/>
               <a:t>Third level</a:t>
             </a:r>
           </a:p>
           <a:p>
             <a:pPr lvl="3"/>
             <a:r>
-              <a:rPr lang="en-US" smtClean="0"/>
+              <a:rPr lang="en-US"/>
               <a:t>Fourth level</a:t>
             </a:r>
           </a:p>
           <a:p>
             <a:pPr lvl="4"/>
             <a:r>
-              <a:rPr lang="en-US" smtClean="0"/>
+              <a:rPr lang="en-US"/>
               <a:t>Fifth level</a:t>
             </a:r>
             <a:endParaRPr lang="en-US" dirty="0"/>
@@ -2278,7 +2860,7 @@
           <a:p>
             <a:fld id="{A2EAEABE-1D59-4413-813E-803E21872067}" type="datetimeFigureOut">
               <a:rPr lang="de-CH" smtClean="0"/>
-              <a:t>22.02.2016</a:t>
+              <a:t>23.02.2016</a:t>
             </a:fld>
             <a:endParaRPr lang="de-CH"/>
           </a:p>
@@ -2377,7 +2959,7 @@
           <a:lstStyle/>
           <a:p>
             <a:r>
-              <a:rPr lang="en-US" smtClean="0"/>
+              <a:rPr lang="en-US"/>
               <a:t>Click to edit Master title style</a:t>
             </a:r>
             <a:endParaRPr lang="en-US" dirty="0"/>
@@ -2443,7 +3025,7 @@
           <a:p>
             <a:pPr lvl="0"/>
             <a:r>
-              <a:rPr lang="en-US" smtClean="0"/>
+              <a:rPr lang="en-US"/>
               <a:t>Edit Master text styles</a:t>
             </a:r>
           </a:p>
@@ -2471,35 +3053,35 @@
           <a:p>
             <a:pPr lvl="0"/>
             <a:r>
-              <a:rPr lang="en-US" smtClean="0"/>
+              <a:rPr lang="en-US"/>
               <a:t>Edit Master text styles</a:t>
             </a:r>
           </a:p>
           <a:p>
             <a:pPr lvl="1"/>
             <a:r>
-              <a:rPr lang="en-US" smtClean="0"/>
+              <a:rPr lang="en-US"/>
               <a:t>Second level</a:t>
             </a:r>
           </a:p>
           <a:p>
             <a:pPr lvl="2"/>
             <a:r>
-              <a:rPr lang="en-US" smtClean="0"/>
+              <a:rPr lang="en-US"/>
               <a:t>Third level</a:t>
             </a:r>
           </a:p>
           <a:p>
             <a:pPr lvl="3"/>
             <a:r>
-              <a:rPr lang="en-US" smtClean="0"/>
+              <a:rPr lang="en-US"/>
               <a:t>Fourth level</a:t>
             </a:r>
           </a:p>
           <a:p>
             <a:pPr lvl="4"/>
             <a:r>
-              <a:rPr lang="en-US" smtClean="0"/>
+              <a:rPr lang="en-US"/>
               <a:t>Fifth level</a:t>
             </a:r>
             <a:endParaRPr lang="en-US" dirty="0"/>
@@ -2565,7 +3147,7 @@
           <a:p>
             <a:pPr lvl="0"/>
             <a:r>
-              <a:rPr lang="en-US" smtClean="0"/>
+              <a:rPr lang="en-US"/>
               <a:t>Edit Master text styles</a:t>
             </a:r>
           </a:p>
@@ -2593,35 +3175,35 @@
           <a:p>
             <a:pPr lvl="0"/>
             <a:r>
-              <a:rPr lang="en-US" smtClean="0"/>
+              <a:rPr lang="en-US"/>
               <a:t>Edit Master text styles</a:t>
             </a:r>
           </a:p>
           <a:p>
             <a:pPr lvl="1"/>
             <a:r>
-              <a:rPr lang="en-US" smtClean="0"/>
+              <a:rPr lang="en-US"/>
               <a:t>Second level</a:t>
             </a:r>
           </a:p>
           <a:p>
             <a:pPr lvl="2"/>
             <a:r>
-              <a:rPr lang="en-US" smtClean="0"/>
+              <a:rPr lang="en-US"/>
               <a:t>Third level</a:t>
             </a:r>
           </a:p>
           <a:p>
             <a:pPr lvl="3"/>
             <a:r>
-              <a:rPr lang="en-US" smtClean="0"/>
+              <a:rPr lang="en-US"/>
               <a:t>Fourth level</a:t>
             </a:r>
           </a:p>
           <a:p>
             <a:pPr lvl="4"/>
             <a:r>
-              <a:rPr lang="en-US" smtClean="0"/>
+              <a:rPr lang="en-US"/>
               <a:t>Fifth level</a:t>
             </a:r>
             <a:endParaRPr lang="en-US" dirty="0"/>
@@ -2645,7 +3227,7 @@
           <a:p>
             <a:fld id="{A2EAEABE-1D59-4413-813E-803E21872067}" type="datetimeFigureOut">
               <a:rPr lang="de-CH" smtClean="0"/>
-              <a:t>22.02.2016</a:t>
+              <a:t>23.02.2016</a:t>
             </a:fld>
             <a:endParaRPr lang="de-CH"/>
           </a:p>
@@ -2739,7 +3321,7 @@
           <a:lstStyle/>
           <a:p>
             <a:r>
-              <a:rPr lang="en-US" smtClean="0"/>
+              <a:rPr lang="en-US"/>
               <a:t>Click to edit Master title style</a:t>
             </a:r>
             <a:endParaRPr lang="en-US" dirty="0"/>
@@ -2763,7 +3345,7 @@
           <a:p>
             <a:fld id="{A2EAEABE-1D59-4413-813E-803E21872067}" type="datetimeFigureOut">
               <a:rPr lang="de-CH" smtClean="0"/>
-              <a:t>22.02.2016</a:t>
+              <a:t>23.02.2016</a:t>
             </a:fld>
             <a:endParaRPr lang="de-CH"/>
           </a:p>
@@ -2858,7 +3440,7 @@
           <a:p>
             <a:fld id="{A2EAEABE-1D59-4413-813E-803E21872067}" type="datetimeFigureOut">
               <a:rPr lang="de-CH" smtClean="0"/>
-              <a:t>22.02.2016</a:t>
+              <a:t>23.02.2016</a:t>
             </a:fld>
             <a:endParaRPr lang="de-CH"/>
           </a:p>
@@ -2961,7 +3543,7 @@
           </a:lstStyle>
           <a:p>
             <a:r>
-              <a:rPr lang="en-US" smtClean="0"/>
+              <a:rPr lang="en-US"/>
               <a:t>Click to edit Master title style</a:t>
             </a:r>
             <a:endParaRPr lang="en-US" dirty="0"/>
@@ -3018,35 +3600,35 @@
           <a:p>
             <a:pPr lvl="0"/>
             <a:r>
-              <a:rPr lang="en-US" smtClean="0"/>
+              <a:rPr lang="en-US"/>
               <a:t>Edit Master text styles</a:t>
             </a:r>
           </a:p>
           <a:p>
             <a:pPr lvl="1"/>
             <a:r>
-              <a:rPr lang="en-US" smtClean="0"/>
+              <a:rPr lang="en-US"/>
               <a:t>Second level</a:t>
             </a:r>
           </a:p>
           <a:p>
             <a:pPr lvl="2"/>
             <a:r>
-              <a:rPr lang="en-US" smtClean="0"/>
+              <a:rPr lang="en-US"/>
               <a:t>Third level</a:t>
             </a:r>
           </a:p>
           <a:p>
             <a:pPr lvl="3"/>
             <a:r>
-              <a:rPr lang="en-US" smtClean="0"/>
+              <a:rPr lang="en-US"/>
               <a:t>Fourth level</a:t>
             </a:r>
           </a:p>
           <a:p>
             <a:pPr lvl="4"/>
             <a:r>
-              <a:rPr lang="en-US" smtClean="0"/>
+              <a:rPr lang="en-US"/>
               <a:t>Fifth level</a:t>
             </a:r>
             <a:endParaRPr lang="en-US" dirty="0"/>
@@ -3112,7 +3694,7 @@
           <a:p>
             <a:pPr lvl="0"/>
             <a:r>
-              <a:rPr lang="en-US" smtClean="0"/>
+              <a:rPr lang="en-US"/>
               <a:t>Edit Master text styles</a:t>
             </a:r>
           </a:p>
@@ -3135,7 +3717,7 @@
           <a:p>
             <a:fld id="{A2EAEABE-1D59-4413-813E-803E21872067}" type="datetimeFigureOut">
               <a:rPr lang="de-CH" smtClean="0"/>
-              <a:t>22.02.2016</a:t>
+              <a:t>23.02.2016</a:t>
             </a:fld>
             <a:endParaRPr lang="de-CH"/>
           </a:p>
@@ -3238,7 +3820,7 @@
           </a:lstStyle>
           <a:p>
             <a:r>
-              <a:rPr lang="en-US" smtClean="0"/>
+              <a:rPr lang="en-US"/>
               <a:t>Click to edit Master title style</a:t>
             </a:r>
             <a:endParaRPr lang="en-US" dirty="0"/>
@@ -3303,7 +3885,7 @@
           </a:lstStyle>
           <a:p>
             <a:r>
-              <a:rPr lang="en-US" smtClean="0"/>
+              <a:rPr lang="en-US"/>
               <a:t>Click icon to add picture</a:t>
             </a:r>
             <a:endParaRPr lang="en-US" dirty="0"/>
@@ -3369,7 +3951,7 @@
           <a:p>
             <a:pPr lvl="0"/>
             <a:r>
-              <a:rPr lang="en-US" smtClean="0"/>
+              <a:rPr lang="en-US"/>
               <a:t>Edit Master text styles</a:t>
             </a:r>
           </a:p>
@@ -3392,7 +3974,7 @@
           <a:p>
             <a:fld id="{A2EAEABE-1D59-4413-813E-803E21872067}" type="datetimeFigureOut">
               <a:rPr lang="de-CH" smtClean="0"/>
-              <a:t>22.02.2016</a:t>
+              <a:t>23.02.2016</a:t>
             </a:fld>
             <a:endParaRPr lang="de-CH"/>
           </a:p>
@@ -3501,10 +4083,9 @@
           <a:lstStyle/>
           <a:p>
             <a:r>
-              <a:rPr lang="en-US" dirty="0" smtClean="0"/>
+              <a:rPr lang="en-US" dirty="0"/>
               <a:t>Click to edit Master title style</a:t>
             </a:r>
-            <a:endParaRPr lang="en-US" dirty="0"/>
           </a:p>
         </p:txBody>
       </p:sp>
@@ -3535,38 +4116,37 @@
           <a:p>
             <a:pPr lvl="0"/>
             <a:r>
-              <a:rPr lang="en-US" dirty="0" smtClean="0"/>
+              <a:rPr lang="en-US" dirty="0"/>
               <a:t>Edit Master text styles</a:t>
             </a:r>
           </a:p>
           <a:p>
             <a:pPr lvl="1"/>
             <a:r>
-              <a:rPr lang="en-US" dirty="0" smtClean="0"/>
+              <a:rPr lang="en-US" dirty="0"/>
               <a:t>Second level</a:t>
             </a:r>
           </a:p>
           <a:p>
             <a:pPr lvl="2"/>
             <a:r>
-              <a:rPr lang="en-US" dirty="0" smtClean="0"/>
+              <a:rPr lang="en-US" dirty="0"/>
               <a:t>Third level</a:t>
             </a:r>
           </a:p>
           <a:p>
             <a:pPr lvl="3"/>
             <a:r>
-              <a:rPr lang="en-US" dirty="0" smtClean="0"/>
+              <a:rPr lang="en-US" dirty="0"/>
               <a:t>Fourth level</a:t>
             </a:r>
           </a:p>
           <a:p>
             <a:pPr lvl="4"/>
             <a:r>
-              <a:rPr lang="en-US" dirty="0" smtClean="0"/>
+              <a:rPr lang="en-US" dirty="0"/>
               <a:t>Fifth level</a:t>
             </a:r>
-            <a:endParaRPr lang="en-US" dirty="0"/>
           </a:p>
         </p:txBody>
       </p:sp>
@@ -3605,7 +4185,7 @@
           <a:p>
             <a:fld id="{A2EAEABE-1D59-4413-813E-803E21872067}" type="datetimeFigureOut">
               <a:rPr lang="de-CH" smtClean="0"/>
-              <a:t>22.02.2016</a:t>
+              <a:t>23.02.2016</a:t>
             </a:fld>
             <a:endParaRPr lang="de-CH"/>
           </a:p>
@@ -4010,238 +4590,49 @@
           <a:chExt cx="0" cy="0"/>
         </a:xfrm>
       </p:grpSpPr>
-      <p:grpSp>
-        <p:nvGrpSpPr>
-          <p:cNvPr id="9" name="Group 8"/>
-          <p:cNvGrpSpPr/>
+      <p:pic>
+        <p:nvPicPr>
+          <p:cNvPr id="4" name="Picture 3"/>
+          <p:cNvPicPr>
+            <a:picLocks noChangeAspect="1"/>
+          </p:cNvPicPr>
           <p:nvPr/>
-        </p:nvGrpSpPr>
-        <p:grpSpPr>
+        </p:nvPicPr>
+        <p:blipFill>
+          <a:blip r:embed="rId2" cstate="print">
+            <a:extLst>
+              <a:ext uri="{BEBA8EAE-BF5A-486C-A8C5-ECC9F3942E4B}">
+                <a14:imgProps xmlns:a14="http://schemas.microsoft.com/office/drawing/2010/main">
+                  <a14:imgLayer r:embed="rId3">
+                    <a14:imgEffect>
+                      <a14:saturation sat="0"/>
+                    </a14:imgEffect>
+                  </a14:imgLayer>
+                </a14:imgProps>
+              </a:ext>
+              <a:ext uri="{28A0092B-C50C-407E-A947-70E740481C1C}">
+                <a14:useLocalDpi xmlns:a14="http://schemas.microsoft.com/office/drawing/2010/main" val="0"/>
+              </a:ext>
+            </a:extLst>
+          </a:blip>
+          <a:stretch>
+            <a:fillRect/>
+          </a:stretch>
+        </p:blipFill>
+        <p:spPr>
           <a:xfrm>
-            <a:off x="1130661" y="1417337"/>
-            <a:ext cx="9930678" cy="4139546"/>
-            <a:chOff x="1719475" y="891253"/>
-            <a:chExt cx="9930678" cy="4139546"/>
+            <a:off x="694750" y="1742883"/>
+            <a:ext cx="5151939" cy="3434626"/>
           </a:xfrm>
-        </p:grpSpPr>
-        <p:sp>
-          <p:nvSpPr>
-            <p:cNvPr id="2" name="Rectangle 1"/>
-            <p:cNvSpPr/>
-            <p:nvPr/>
-          </p:nvSpPr>
-          <p:spPr>
-            <a:xfrm>
-              <a:off x="1719475" y="891253"/>
-              <a:ext cx="4139275" cy="2215991"/>
-            </a:xfrm>
-            <a:prstGeom prst="rect">
-              <a:avLst/>
-            </a:prstGeom>
-          </p:spPr>
-          <p:txBody>
-            <a:bodyPr wrap="none">
-              <a:spAutoFit/>
-            </a:bodyPr>
-            <a:lstStyle/>
-            <a:p>
-              <a:r>
-                <a:rPr lang="en-US" sz="13800" dirty="0" smtClean="0">
-                  <a:solidFill>
-                    <a:schemeClr val="accent2"/>
-                  </a:solidFill>
-                  <a:latin typeface="Yanone Kaffeesatz Regular" panose="02000000000000000000" pitchFamily="2" charset="0"/>
-                </a:rPr>
-                <a:t>parallel</a:t>
-              </a:r>
-              <a:endParaRPr lang="de-CH" dirty="0"/>
-            </a:p>
-          </p:txBody>
-        </p:sp>
-        <p:sp>
-          <p:nvSpPr>
-            <p:cNvPr id="3" name="Rectangle 2"/>
-            <p:cNvSpPr/>
-            <p:nvPr/>
-          </p:nvSpPr>
-          <p:spPr>
-            <a:xfrm>
-              <a:off x="6784719" y="1139186"/>
-              <a:ext cx="4865434" cy="1200329"/>
-            </a:xfrm>
-            <a:prstGeom prst="rect">
-              <a:avLst/>
-            </a:prstGeom>
-          </p:spPr>
-          <p:txBody>
-            <a:bodyPr wrap="none">
-              <a:spAutoFit/>
-            </a:bodyPr>
-            <a:lstStyle/>
-            <a:p>
-              <a:r>
-                <a:rPr lang="en-US" sz="3600" dirty="0" smtClean="0">
-                  <a:solidFill>
-                    <a:schemeClr val="tx2"/>
-                  </a:solidFill>
-                  <a:latin typeface="Yanone Kaffeesatz Regular" panose="02000000000000000000" pitchFamily="2" charset="0"/>
-                </a:rPr>
-                <a:t>Multiple people sitting in cubicles</a:t>
-              </a:r>
-              <a:br>
-                <a:rPr lang="en-US" sz="3600" dirty="0" smtClean="0">
-                  <a:solidFill>
-                    <a:schemeClr val="tx2"/>
-                  </a:solidFill>
-                  <a:latin typeface="Yanone Kaffeesatz Regular" panose="02000000000000000000" pitchFamily="2" charset="0"/>
-                </a:rPr>
-              </a:br>
-              <a:r>
-                <a:rPr lang="en-US" sz="3600" dirty="0" smtClean="0">
-                  <a:solidFill>
-                    <a:schemeClr val="tx2"/>
-                  </a:solidFill>
-                  <a:latin typeface="Yanone Kaffeesatz Regular" panose="02000000000000000000" pitchFamily="2" charset="0"/>
-                </a:rPr>
-                <a:t> working on a project</a:t>
-              </a:r>
-            </a:p>
-          </p:txBody>
-        </p:sp>
-        <p:sp>
-          <p:nvSpPr>
-            <p:cNvPr id="6" name="Rectangle 5"/>
-            <p:cNvSpPr/>
-            <p:nvPr/>
-          </p:nvSpPr>
-          <p:spPr>
-            <a:xfrm rot="16200000">
-              <a:off x="4132475" y="2426720"/>
-              <a:ext cx="4007828" cy="1200329"/>
-            </a:xfrm>
-            <a:prstGeom prst="rect">
-              <a:avLst/>
-            </a:prstGeom>
-          </p:spPr>
-          <p:txBody>
-            <a:bodyPr wrap="none">
-              <a:spAutoFit/>
-            </a:bodyPr>
-            <a:lstStyle/>
-            <a:p>
-              <a:r>
-                <a:rPr lang="en-US" sz="7200" dirty="0" smtClean="0">
-                  <a:solidFill>
-                    <a:schemeClr val="accent3"/>
-                  </a:solidFill>
-                  <a:latin typeface="Yanone Kaffeesatz Regular" panose="02000000000000000000" pitchFamily="2" charset="0"/>
-                </a:rPr>
-                <a:t>simultaneous</a:t>
-              </a:r>
-            </a:p>
-          </p:txBody>
-        </p:sp>
-        <p:sp>
-          <p:nvSpPr>
-            <p:cNvPr id="7" name="Rectangle 6"/>
-            <p:cNvSpPr/>
-            <p:nvPr/>
-          </p:nvSpPr>
-          <p:spPr>
-            <a:xfrm>
-              <a:off x="1719475" y="2698589"/>
-              <a:ext cx="4139275" cy="2215991"/>
-            </a:xfrm>
-            <a:prstGeom prst="rect">
-              <a:avLst/>
-            </a:prstGeom>
-          </p:spPr>
-          <p:txBody>
-            <a:bodyPr wrap="none">
-              <a:spAutoFit/>
-            </a:bodyPr>
-            <a:lstStyle/>
-            <a:p>
-              <a:r>
-                <a:rPr lang="en-US" sz="13800" dirty="0" smtClean="0">
-                  <a:solidFill>
-                    <a:schemeClr val="accent2"/>
-                  </a:solidFill>
-                  <a:latin typeface="Yanone Kaffeesatz Regular" panose="02000000000000000000" pitchFamily="2" charset="0"/>
-                </a:rPr>
-                <a:t>parallel</a:t>
-              </a:r>
-              <a:endParaRPr lang="de-CH" dirty="0"/>
-            </a:p>
-          </p:txBody>
-        </p:sp>
-        <p:sp>
-          <p:nvSpPr>
-            <p:cNvPr id="8" name="Rectangle 7"/>
-            <p:cNvSpPr/>
-            <p:nvPr/>
-          </p:nvSpPr>
-          <p:spPr>
-            <a:xfrm>
-              <a:off x="6644221" y="3382184"/>
-              <a:ext cx="4786888" cy="1200329"/>
-            </a:xfrm>
-            <a:prstGeom prst="rect">
-              <a:avLst/>
-            </a:prstGeom>
-          </p:spPr>
-          <p:txBody>
-            <a:bodyPr wrap="none">
-              <a:spAutoFit/>
-            </a:bodyPr>
-            <a:lstStyle/>
-            <a:p>
-              <a:r>
-                <a:rPr lang="en-US" sz="3600" dirty="0" smtClean="0">
-                  <a:solidFill>
-                    <a:schemeClr val="tx2"/>
-                  </a:solidFill>
-                  <a:latin typeface="Yanone Kaffeesatz Regular" panose="02000000000000000000" pitchFamily="2" charset="0"/>
-                </a:rPr>
-                <a:t>Work </a:t>
-              </a:r>
-              <a:r>
-                <a:rPr lang="en-US" sz="3600" dirty="0" smtClean="0">
-                  <a:solidFill>
-                    <a:schemeClr val="accent4"/>
-                  </a:solidFill>
-                  <a:latin typeface="Yanone Kaffeesatz Regular" panose="02000000000000000000" pitchFamily="2" charset="0"/>
-                </a:rPr>
-                <a:t>is</a:t>
-              </a:r>
-              <a:r>
-                <a:rPr lang="en-US" sz="3600" dirty="0" smtClean="0">
-                  <a:solidFill>
-                    <a:schemeClr val="tx2"/>
-                  </a:solidFill>
-                  <a:latin typeface="Yanone Kaffeesatz Regular" panose="02000000000000000000" pitchFamily="2" charset="0"/>
-                </a:rPr>
-                <a:t> distributed over threads</a:t>
-              </a:r>
-            </a:p>
-            <a:p>
-              <a:r>
-                <a:rPr lang="en-US" sz="3600" dirty="0" smtClean="0">
-                  <a:solidFill>
-                    <a:schemeClr val="tx2"/>
-                  </a:solidFill>
-                  <a:latin typeface="Yanone Kaffeesatz Regular" panose="02000000000000000000" pitchFamily="2" charset="0"/>
-                </a:rPr>
-                <a:t>and processors</a:t>
-              </a:r>
-            </a:p>
-          </p:txBody>
-        </p:sp>
-      </p:grpSp>
+          <a:prstGeom prst="rect">
+            <a:avLst/>
+          </a:prstGeom>
+        </p:spPr>
+      </p:pic>
     </p:spTree>
     <p:extLst>
       <p:ext uri="{BB962C8B-B14F-4D97-AF65-F5344CB8AC3E}">
-        <p14:creationId xmlns:p14="http://schemas.microsoft.com/office/powerpoint/2010/main" val="403767496"/>
+        <p14:creationId xmlns:p14="http://schemas.microsoft.com/office/powerpoint/2010/main" val="3601279917"/>
       </p:ext>
     </p:extLst>
   </p:cSld>
@@ -4276,6 +4667,268 @@
         </p:nvSpPr>
         <p:spPr>
           <a:xfrm>
+            <a:off x="1298199" y="1315449"/>
+            <a:ext cx="9881231" cy="3154710"/>
+          </a:xfrm>
+          <a:prstGeom prst="rect">
+            <a:avLst/>
+          </a:prstGeom>
+        </p:spPr>
+        <p:txBody>
+          <a:bodyPr wrap="none">
+            <a:spAutoFit/>
+          </a:bodyPr>
+          <a:lstStyle/>
+          <a:p>
+            <a:r>
+              <a:rPr lang="en-US" sz="19900" dirty="0" err="1">
+                <a:solidFill>
+                  <a:schemeClr val="accent2"/>
+                </a:solidFill>
+                <a:latin typeface="Yanone Kaffeesatz Regular" panose="02000000000000000000" pitchFamily="2" charset="0"/>
+              </a:rPr>
+              <a:t>async</a:t>
+            </a:r>
+            <a:r>
+              <a:rPr lang="en-US" sz="19900" dirty="0">
+                <a:solidFill>
+                  <a:schemeClr val="accent2"/>
+                </a:solidFill>
+                <a:latin typeface="Yanone Kaffeesatz Regular" panose="02000000000000000000" pitchFamily="2" charset="0"/>
+              </a:rPr>
+              <a:t>/await</a:t>
+            </a:r>
+            <a:endParaRPr lang="de-CH" sz="2000" dirty="0"/>
+          </a:p>
+        </p:txBody>
+      </p:sp>
+      <p:sp>
+        <p:nvSpPr>
+          <p:cNvPr id="3" name="Rectangle 2"/>
+          <p:cNvSpPr/>
+          <p:nvPr/>
+        </p:nvSpPr>
+        <p:spPr>
+          <a:xfrm>
+            <a:off x="6483462" y="4128445"/>
+            <a:ext cx="4544834" cy="1200329"/>
+          </a:xfrm>
+          <a:prstGeom prst="rect">
+            <a:avLst/>
+          </a:prstGeom>
+        </p:spPr>
+        <p:txBody>
+          <a:bodyPr wrap="none">
+            <a:spAutoFit/>
+          </a:bodyPr>
+          <a:lstStyle/>
+          <a:p>
+            <a:r>
+              <a:rPr lang="en-US" sz="7200" dirty="0">
+                <a:solidFill>
+                  <a:schemeClr val="tx2"/>
+                </a:solidFill>
+                <a:latin typeface="Yanone Kaffeesatz Regular" panose="02000000000000000000" pitchFamily="2" charset="0"/>
+              </a:rPr>
+              <a:t>syntactic sugar</a:t>
+            </a:r>
+            <a:endParaRPr lang="de-CH" sz="7200" dirty="0">
+              <a:solidFill>
+                <a:schemeClr val="tx2"/>
+              </a:solidFill>
+            </a:endParaRPr>
+          </a:p>
+        </p:txBody>
+      </p:sp>
+      <p:sp>
+        <p:nvSpPr>
+          <p:cNvPr id="4" name="Rectangle 3"/>
+          <p:cNvSpPr/>
+          <p:nvPr/>
+        </p:nvSpPr>
+        <p:spPr>
+          <a:xfrm>
+            <a:off x="8755879" y="4984782"/>
+            <a:ext cx="2501006" cy="584775"/>
+          </a:xfrm>
+          <a:prstGeom prst="rect">
+            <a:avLst/>
+          </a:prstGeom>
+        </p:spPr>
+        <p:txBody>
+          <a:bodyPr wrap="none">
+            <a:spAutoFit/>
+          </a:bodyPr>
+          <a:lstStyle/>
+          <a:p>
+            <a:r>
+              <a:rPr lang="en-US" sz="3200" dirty="0">
+                <a:solidFill>
+                  <a:schemeClr val="accent4"/>
+                </a:solidFill>
+                <a:latin typeface="Yanone Kaffeesatz Regular" panose="02000000000000000000" pitchFamily="2" charset="0"/>
+              </a:rPr>
+              <a:t>compiler        magic</a:t>
+            </a:r>
+            <a:endParaRPr lang="de-CH" sz="3200" dirty="0">
+              <a:solidFill>
+                <a:schemeClr val="accent4"/>
+              </a:solidFill>
+            </a:endParaRPr>
+          </a:p>
+        </p:txBody>
+      </p:sp>
+    </p:spTree>
+    <p:extLst>
+      <p:ext uri="{BB962C8B-B14F-4D97-AF65-F5344CB8AC3E}">
+        <p14:creationId xmlns:p14="http://schemas.microsoft.com/office/powerpoint/2010/main" val="4052507699"/>
+      </p:ext>
+    </p:extLst>
+  </p:cSld>
+  <p:clrMapOvr>
+    <a:masterClrMapping/>
+  </p:clrMapOvr>
+</p:sld>
+</file>
+
+<file path=ppt/slides/slide11.xml><?xml version="1.0" encoding="utf-8"?>
+<p:sld xmlns:a="http://schemas.openxmlformats.org/drawingml/2006/main" xmlns:r="http://schemas.openxmlformats.org/officeDocument/2006/relationships" xmlns:p="http://schemas.openxmlformats.org/presentationml/2006/main">
+  <p:cSld>
+    <p:spTree>
+      <p:nvGrpSpPr>
+        <p:cNvPr id="1" name=""/>
+        <p:cNvGrpSpPr/>
+        <p:nvPr/>
+      </p:nvGrpSpPr>
+      <p:grpSpPr>
+        <a:xfrm>
+          <a:off x="0" y="0"/>
+          <a:ext cx="0" cy="0"/>
+          <a:chOff x="0" y="0"/>
+          <a:chExt cx="0" cy="0"/>
+        </a:xfrm>
+      </p:grpSpPr>
+      <p:sp>
+        <p:nvSpPr>
+          <p:cNvPr id="2" name="Rectangle 1"/>
+          <p:cNvSpPr/>
+          <p:nvPr/>
+        </p:nvSpPr>
+        <p:spPr>
+          <a:xfrm>
+            <a:off x="1957688" y="1536174"/>
+            <a:ext cx="8276625" cy="3785652"/>
+          </a:xfrm>
+          <a:prstGeom prst="rect">
+            <a:avLst/>
+          </a:prstGeom>
+        </p:spPr>
+        <p:txBody>
+          <a:bodyPr wrap="none">
+            <a:spAutoFit/>
+          </a:bodyPr>
+          <a:lstStyle/>
+          <a:p>
+            <a:r>
+              <a:rPr lang="en-US" sz="8000" dirty="0" err="1">
+                <a:solidFill>
+                  <a:schemeClr val="tx2"/>
+                </a:solidFill>
+                <a:latin typeface="Yanone Kaffeesatz Regular" panose="02000000000000000000" pitchFamily="2" charset="0"/>
+              </a:rPr>
+              <a:t>task.ContinueWith</a:t>
+            </a:r>
+            <a:r>
+              <a:rPr lang="en-US" sz="8000" dirty="0">
+                <a:solidFill>
+                  <a:schemeClr val="tx2"/>
+                </a:solidFill>
+                <a:latin typeface="Yanone Kaffeesatz Regular" panose="02000000000000000000" pitchFamily="2" charset="0"/>
+              </a:rPr>
+              <a:t>(t =&gt; { </a:t>
+            </a:r>
+          </a:p>
+          <a:p>
+            <a:r>
+              <a:rPr lang="en-US" sz="8000" dirty="0">
+                <a:solidFill>
+                  <a:schemeClr val="tx2"/>
+                </a:solidFill>
+                <a:latin typeface="Yanone Kaffeesatz Regular" panose="02000000000000000000" pitchFamily="2" charset="0"/>
+              </a:rPr>
+              <a:t>   </a:t>
+            </a:r>
+            <a:r>
+              <a:rPr lang="en-US" sz="8000" dirty="0">
+                <a:solidFill>
+                  <a:schemeClr val="accent4"/>
+                </a:solidFill>
+                <a:latin typeface="Yanone Kaffeesatz Regular" panose="02000000000000000000" pitchFamily="2" charset="0"/>
+              </a:rPr>
+              <a:t>continuation</a:t>
+            </a:r>
+            <a:r>
+              <a:rPr lang="en-US" sz="8000" dirty="0">
+                <a:solidFill>
+                  <a:schemeClr val="tx2"/>
+                </a:solidFill>
+                <a:latin typeface="Yanone Kaffeesatz Regular" panose="02000000000000000000" pitchFamily="2" charset="0"/>
+              </a:rPr>
+              <a:t>;</a:t>
+            </a:r>
+          </a:p>
+          <a:p>
+            <a:r>
+              <a:rPr lang="en-US" sz="8000" dirty="0">
+                <a:solidFill>
+                  <a:schemeClr val="tx2"/>
+                </a:solidFill>
+                <a:latin typeface="Yanone Kaffeesatz Regular" panose="02000000000000000000" pitchFamily="2" charset="0"/>
+              </a:rPr>
+              <a:t>});</a:t>
+            </a:r>
+            <a:endParaRPr lang="de-CH" sz="1400" dirty="0"/>
+          </a:p>
+        </p:txBody>
+      </p:sp>
+    </p:spTree>
+    <p:extLst>
+      <p:ext uri="{BB962C8B-B14F-4D97-AF65-F5344CB8AC3E}">
+        <p14:creationId xmlns:p14="http://schemas.microsoft.com/office/powerpoint/2010/main" val="301706458"/>
+      </p:ext>
+    </p:extLst>
+  </p:cSld>
+  <p:clrMapOvr>
+    <a:masterClrMapping/>
+  </p:clrMapOvr>
+</p:sld>
+</file>
+
+<file path=ppt/slides/slide12.xml><?xml version="1.0" encoding="utf-8"?>
+<p:sld xmlns:a="http://schemas.openxmlformats.org/drawingml/2006/main" xmlns:r="http://schemas.openxmlformats.org/officeDocument/2006/relationships" xmlns:p="http://schemas.openxmlformats.org/presentationml/2006/main">
+  <p:cSld>
+    <p:spTree>
+      <p:nvGrpSpPr>
+        <p:cNvPr id="1" name=""/>
+        <p:cNvGrpSpPr/>
+        <p:nvPr/>
+      </p:nvGrpSpPr>
+      <p:grpSpPr>
+        <a:xfrm>
+          <a:off x="0" y="0"/>
+          <a:ext cx="0" cy="0"/>
+          <a:chOff x="0" y="0"/>
+          <a:chExt cx="0" cy="0"/>
+        </a:xfrm>
+      </p:grpSpPr>
+      <p:sp>
+        <p:nvSpPr>
+          <p:cNvPr id="2" name="Rectangle 1"/>
+          <p:cNvSpPr/>
+          <p:nvPr/>
+        </p:nvSpPr>
+        <p:spPr>
+          <a:xfrm>
             <a:off x="3509395" y="1905506"/>
             <a:ext cx="5173211" cy="3046988"/>
           </a:xfrm>
@@ -4296,39 +4949,21 @@
                 </a:solidFill>
                 <a:latin typeface="Yanone Kaffeesatz Regular" panose="02000000000000000000" pitchFamily="2" charset="0"/>
               </a:rPr>
-              <a:t>a</a:t>
-            </a:r>
-            <a:r>
-              <a:rPr lang="en-US" sz="9600" dirty="0" smtClean="0">
-                <a:solidFill>
-                  <a:schemeClr val="tx2"/>
+              <a:t>await task;</a:t>
+            </a:r>
+          </a:p>
+          <a:p>
+            <a:r>
+              <a:rPr lang="en-US" sz="9600" dirty="0">
+                <a:solidFill>
+                  <a:schemeClr val="accent4"/>
                 </a:solidFill>
                 <a:latin typeface="Yanone Kaffeesatz Regular" panose="02000000000000000000" pitchFamily="2" charset="0"/>
               </a:rPr>
-              <a:t>wait task;</a:t>
-            </a:r>
-          </a:p>
-          <a:p>
+              <a:t>continuation</a:t>
+            </a:r>
             <a:r>
               <a:rPr lang="en-US" sz="9600" dirty="0">
-                <a:solidFill>
-                  <a:schemeClr val="accent4"/>
-                </a:solidFill>
-                <a:latin typeface="Yanone Kaffeesatz Regular" panose="02000000000000000000" pitchFamily="2" charset="0"/>
-              </a:rPr>
-              <a:t>c</a:t>
-            </a:r>
-            <a:r>
-              <a:rPr lang="en-US" sz="9600" dirty="0" smtClean="0">
-                <a:solidFill>
-                  <a:schemeClr val="accent4"/>
-                </a:solidFill>
-                <a:latin typeface="Yanone Kaffeesatz Regular" panose="02000000000000000000" pitchFamily="2" charset="0"/>
-              </a:rPr>
-              <a:t>ontinuation</a:t>
-            </a:r>
-            <a:r>
-              <a:rPr lang="en-US" sz="9600" dirty="0" smtClean="0">
                 <a:solidFill>
                   <a:schemeClr val="tx2"/>
                 </a:solidFill>
@@ -4344,6 +4979,279 @@
     <p:extLst>
       <p:ext uri="{BB962C8B-B14F-4D97-AF65-F5344CB8AC3E}">
         <p14:creationId xmlns:p14="http://schemas.microsoft.com/office/powerpoint/2010/main" val="3888477285"/>
+      </p:ext>
+    </p:extLst>
+  </p:cSld>
+  <p:clrMapOvr>
+    <a:masterClrMapping/>
+  </p:clrMapOvr>
+</p:sld>
+</file>
+
+<file path=ppt/slides/slide13.xml><?xml version="1.0" encoding="utf-8"?>
+<p:sld xmlns:a="http://schemas.openxmlformats.org/drawingml/2006/main" xmlns:r="http://schemas.openxmlformats.org/officeDocument/2006/relationships" xmlns:p="http://schemas.openxmlformats.org/presentationml/2006/main">
+  <p:cSld>
+    <p:spTree>
+      <p:nvGrpSpPr>
+        <p:cNvPr id="1" name=""/>
+        <p:cNvGrpSpPr/>
+        <p:nvPr/>
+      </p:nvGrpSpPr>
+      <p:grpSpPr>
+        <a:xfrm>
+          <a:off x="0" y="0"/>
+          <a:ext cx="0" cy="0"/>
+          <a:chOff x="0" y="0"/>
+          <a:chExt cx="0" cy="0"/>
+        </a:xfrm>
+      </p:grpSpPr>
+      <p:sp>
+        <p:nvSpPr>
+          <p:cNvPr id="2" name="Rectangle 1"/>
+          <p:cNvSpPr/>
+          <p:nvPr/>
+        </p:nvSpPr>
+        <p:spPr>
+          <a:xfrm>
+            <a:off x="3853239" y="1851645"/>
+            <a:ext cx="4485523" cy="3154710"/>
+          </a:xfrm>
+          <a:prstGeom prst="rect">
+            <a:avLst/>
+          </a:prstGeom>
+        </p:spPr>
+        <p:txBody>
+          <a:bodyPr wrap="none">
+            <a:spAutoFit/>
+          </a:bodyPr>
+          <a:lstStyle/>
+          <a:p>
+            <a:r>
+              <a:rPr lang="en-US" sz="19900" dirty="0">
+                <a:solidFill>
+                  <a:schemeClr val="accent2"/>
+                </a:solidFill>
+                <a:latin typeface="Yanone Kaffeesatz Regular" panose="02000000000000000000" pitchFamily="2" charset="0"/>
+              </a:rPr>
+              <a:t>Demo</a:t>
+            </a:r>
+            <a:endParaRPr lang="de-CH" sz="2000" dirty="0"/>
+          </a:p>
+        </p:txBody>
+      </p:sp>
+      <p:sp>
+        <p:nvSpPr>
+          <p:cNvPr id="5" name="Rectangle 4"/>
+          <p:cNvSpPr/>
+          <p:nvPr/>
+        </p:nvSpPr>
+        <p:spPr>
+          <a:xfrm>
+            <a:off x="1838261" y="2875002"/>
+            <a:ext cx="1635384" cy="1107996"/>
+          </a:xfrm>
+          <a:prstGeom prst="rect">
+            <a:avLst/>
+          </a:prstGeom>
+        </p:spPr>
+        <p:txBody>
+          <a:bodyPr wrap="none">
+            <a:spAutoFit/>
+          </a:bodyPr>
+          <a:lstStyle/>
+          <a:p>
+            <a:r>
+              <a:rPr lang="en-US" sz="6600" dirty="0">
+                <a:solidFill>
+                  <a:schemeClr val="accent4"/>
+                </a:solidFill>
+                <a:latin typeface="Yanone Kaffeesatz Regular" panose="02000000000000000000" pitchFamily="2" charset="0"/>
+              </a:rPr>
+              <a:t>await</a:t>
+            </a:r>
+            <a:endParaRPr lang="de-CH" sz="6600" dirty="0"/>
+          </a:p>
+        </p:txBody>
+      </p:sp>
+    </p:spTree>
+    <p:extLst>
+      <p:ext uri="{BB962C8B-B14F-4D97-AF65-F5344CB8AC3E}">
+        <p14:creationId xmlns:p14="http://schemas.microsoft.com/office/powerpoint/2010/main" val="1084023105"/>
+      </p:ext>
+    </p:extLst>
+  </p:cSld>
+  <p:clrMapOvr>
+    <a:masterClrMapping/>
+  </p:clrMapOvr>
+</p:sld>
+</file>
+
+<file path=ppt/slides/slide14.xml><?xml version="1.0" encoding="utf-8"?>
+<p:sld xmlns:a="http://schemas.openxmlformats.org/drawingml/2006/main" xmlns:r="http://schemas.openxmlformats.org/officeDocument/2006/relationships" xmlns:p="http://schemas.openxmlformats.org/presentationml/2006/main">
+  <p:cSld>
+    <p:spTree>
+      <p:nvGrpSpPr>
+        <p:cNvPr id="1" name=""/>
+        <p:cNvGrpSpPr/>
+        <p:nvPr/>
+      </p:nvGrpSpPr>
+      <p:grpSpPr>
+        <a:xfrm>
+          <a:off x="0" y="0"/>
+          <a:ext cx="0" cy="0"/>
+          <a:chOff x="0" y="0"/>
+          <a:chExt cx="0" cy="0"/>
+        </a:xfrm>
+      </p:grpSpPr>
+      <p:sp>
+        <p:nvSpPr>
+          <p:cNvPr id="2" name="Rectangle 1"/>
+          <p:cNvSpPr/>
+          <p:nvPr/>
+        </p:nvSpPr>
+        <p:spPr>
+          <a:xfrm>
+            <a:off x="3853239" y="1851645"/>
+            <a:ext cx="4738798" cy="3154710"/>
+          </a:xfrm>
+          <a:prstGeom prst="rect">
+            <a:avLst/>
+          </a:prstGeom>
+        </p:spPr>
+        <p:txBody>
+          <a:bodyPr wrap="none">
+            <a:spAutoFit/>
+          </a:bodyPr>
+          <a:lstStyle/>
+          <a:p>
+            <a:r>
+              <a:rPr lang="en-US" sz="19900" dirty="0">
+                <a:solidFill>
+                  <a:schemeClr val="accent2"/>
+                </a:solidFill>
+                <a:latin typeface="Yanone Kaffeesatz Regular" panose="02000000000000000000" pitchFamily="2" charset="0"/>
+              </a:rPr>
+              <a:t>Recap</a:t>
+            </a:r>
+            <a:endParaRPr lang="de-CH" sz="2000" dirty="0"/>
+          </a:p>
+        </p:txBody>
+      </p:sp>
+    </p:spTree>
+    <p:extLst>
+      <p:ext uri="{BB962C8B-B14F-4D97-AF65-F5344CB8AC3E}">
+        <p14:creationId xmlns:p14="http://schemas.microsoft.com/office/powerpoint/2010/main" val="86631759"/>
+      </p:ext>
+    </p:extLst>
+  </p:cSld>
+  <p:clrMapOvr>
+    <a:masterClrMapping/>
+  </p:clrMapOvr>
+</p:sld>
+</file>
+
+<file path=ppt/slides/slide15.xml><?xml version="1.0" encoding="utf-8"?>
+<p:sld xmlns:a="http://schemas.openxmlformats.org/drawingml/2006/main" xmlns:r="http://schemas.openxmlformats.org/officeDocument/2006/relationships" xmlns:p="http://schemas.openxmlformats.org/presentationml/2006/main">
+  <p:cSld>
+    <p:spTree>
+      <p:nvGrpSpPr>
+        <p:cNvPr id="1" name=""/>
+        <p:cNvGrpSpPr/>
+        <p:nvPr/>
+      </p:nvGrpSpPr>
+      <p:grpSpPr>
+        <a:xfrm>
+          <a:off x="0" y="0"/>
+          <a:ext cx="0" cy="0"/>
+          <a:chOff x="0" y="0"/>
+          <a:chExt cx="0" cy="0"/>
+        </a:xfrm>
+      </p:grpSpPr>
+      <p:sp>
+        <p:nvSpPr>
+          <p:cNvPr id="2" name="Rectangle 1"/>
+          <p:cNvSpPr/>
+          <p:nvPr/>
+        </p:nvSpPr>
+        <p:spPr>
+          <a:xfrm>
+            <a:off x="1064014" y="3127733"/>
+            <a:ext cx="10063973" cy="923330"/>
+          </a:xfrm>
+          <a:prstGeom prst="rect">
+            <a:avLst/>
+          </a:prstGeom>
+        </p:spPr>
+        <p:txBody>
+          <a:bodyPr wrap="none">
+            <a:spAutoFit/>
+          </a:bodyPr>
+          <a:lstStyle/>
+          <a:p>
+            <a:r>
+              <a:rPr lang="en-US" sz="3600" dirty="0">
+                <a:solidFill>
+                  <a:schemeClr val="tx2"/>
+                </a:solidFill>
+                <a:latin typeface="Yanone Kaffeesatz Regular" panose="02000000000000000000" pitchFamily="2" charset="0"/>
+              </a:rPr>
+              <a:t>github.com/danielmarbach/</a:t>
+            </a:r>
+            <a:r>
+              <a:rPr lang="en-US" sz="5400" dirty="0">
+                <a:solidFill>
+                  <a:schemeClr val="accent4"/>
+                </a:solidFill>
+                <a:latin typeface="Yanone Kaffeesatz Regular" panose="02000000000000000000" pitchFamily="2" charset="0"/>
+              </a:rPr>
+              <a:t>02-25-2016-AsyncWebinar</a:t>
+            </a:r>
+            <a:endParaRPr lang="de-CH" sz="4000" dirty="0">
+              <a:solidFill>
+                <a:schemeClr val="accent4"/>
+              </a:solidFill>
+            </a:endParaRPr>
+          </a:p>
+        </p:txBody>
+      </p:sp>
+      <p:sp>
+        <p:nvSpPr>
+          <p:cNvPr id="4" name="Rectangle 3"/>
+          <p:cNvSpPr/>
+          <p:nvPr/>
+        </p:nvSpPr>
+        <p:spPr>
+          <a:xfrm>
+            <a:off x="1064014" y="1124536"/>
+            <a:ext cx="6463629" cy="1862048"/>
+          </a:xfrm>
+          <a:prstGeom prst="rect">
+            <a:avLst/>
+          </a:prstGeom>
+        </p:spPr>
+        <p:txBody>
+          <a:bodyPr wrap="none">
+            <a:spAutoFit/>
+          </a:bodyPr>
+          <a:lstStyle/>
+          <a:p>
+            <a:r>
+              <a:rPr lang="en-US" sz="11500" dirty="0">
+                <a:solidFill>
+                  <a:schemeClr val="accent2"/>
+                </a:solidFill>
+                <a:latin typeface="Yanone Kaffeesatz Regular" panose="02000000000000000000" pitchFamily="2" charset="0"/>
+              </a:rPr>
+              <a:t>Slides, Links…</a:t>
+            </a:r>
+            <a:endParaRPr lang="de-CH" sz="1400" dirty="0"/>
+          </a:p>
+        </p:txBody>
+      </p:sp>
+    </p:spTree>
+    <p:extLst>
+      <p:ext uri="{BB962C8B-B14F-4D97-AF65-F5344CB8AC3E}">
+        <p14:creationId xmlns:p14="http://schemas.microsoft.com/office/powerpoint/2010/main" val="1581449120"/>
       </p:ext>
     </p:extLst>
   </p:cSld>
@@ -4372,351 +5280,263 @@
       </p:grpSpPr>
       <p:grpSp>
         <p:nvGrpSpPr>
-          <p:cNvPr id="4" name="Group 3"/>
+          <p:cNvPr id="9" name="Group 8"/>
           <p:cNvGrpSpPr/>
           <p:nvPr/>
         </p:nvGrpSpPr>
         <p:grpSpPr>
           <a:xfrm>
-            <a:off x="403106" y="2141247"/>
-            <a:ext cx="11363117" cy="3371436"/>
-            <a:chOff x="230185" y="1150439"/>
-            <a:chExt cx="11363117" cy="3371436"/>
+            <a:off x="1" y="0"/>
+            <a:ext cx="12191998" cy="6858001"/>
+            <a:chOff x="588815" y="-526084"/>
+            <a:chExt cx="12191998" cy="6858001"/>
           </a:xfrm>
         </p:grpSpPr>
-        <p:grpSp>
-          <p:nvGrpSpPr>
-            <p:cNvPr id="9" name="Group 8"/>
-            <p:cNvGrpSpPr/>
-            <p:nvPr/>
-          </p:nvGrpSpPr>
-          <p:grpSpPr>
-            <a:xfrm>
-              <a:off x="4947413" y="1150439"/>
-              <a:ext cx="6645889" cy="3371436"/>
-              <a:chOff x="5536227" y="624355"/>
-              <a:chExt cx="6645889" cy="3371436"/>
-            </a:xfrm>
-          </p:grpSpPr>
-          <p:sp>
-            <p:nvSpPr>
-              <p:cNvPr id="3" name="Rectangle 2"/>
-              <p:cNvSpPr/>
-              <p:nvPr/>
-            </p:nvSpPr>
-            <p:spPr>
-              <a:xfrm>
-                <a:off x="6825361" y="891252"/>
-                <a:ext cx="4605748" cy="1200329"/>
-              </a:xfrm>
-              <a:prstGeom prst="rect">
-                <a:avLst/>
-              </a:prstGeom>
-            </p:spPr>
-            <p:txBody>
-              <a:bodyPr wrap="none">
-                <a:spAutoFit/>
-              </a:bodyPr>
-              <a:lstStyle/>
-              <a:p>
-                <a:r>
-                  <a:rPr lang="en-US" sz="3600" dirty="0" smtClean="0">
-                    <a:solidFill>
-                      <a:schemeClr val="tx2"/>
-                    </a:solidFill>
-                    <a:latin typeface="Yanone Kaffeesatz Regular" panose="02000000000000000000" pitchFamily="2" charset="0"/>
-                  </a:rPr>
-                  <a:t>A person juggling multiple balls</a:t>
-                </a:r>
-                <a:br>
-                  <a:rPr lang="en-US" sz="3600" dirty="0" smtClean="0">
-                    <a:solidFill>
-                      <a:schemeClr val="tx2"/>
-                    </a:solidFill>
-                    <a:latin typeface="Yanone Kaffeesatz Regular" panose="02000000000000000000" pitchFamily="2" charset="0"/>
-                  </a:rPr>
-                </a:br>
-                <a:r>
-                  <a:rPr lang="en-US" sz="3600" dirty="0" smtClean="0">
-                    <a:solidFill>
-                      <a:schemeClr val="tx2"/>
-                    </a:solidFill>
-                    <a:latin typeface="Yanone Kaffeesatz Regular" panose="02000000000000000000" pitchFamily="2" charset="0"/>
-                  </a:rPr>
-                  <a:t>concurrently</a:t>
-                </a:r>
-              </a:p>
-            </p:txBody>
-          </p:sp>
-          <p:sp>
-            <p:nvSpPr>
-              <p:cNvPr id="6" name="Rectangle 5"/>
-              <p:cNvSpPr/>
-              <p:nvPr/>
-            </p:nvSpPr>
-            <p:spPr>
-              <a:xfrm rot="16200000">
-                <a:off x="4450674" y="1709908"/>
-                <a:ext cx="3371436" cy="1200329"/>
-              </a:xfrm>
-              <a:prstGeom prst="rect">
-                <a:avLst/>
-              </a:prstGeom>
-            </p:spPr>
-            <p:txBody>
-              <a:bodyPr wrap="none">
-                <a:spAutoFit/>
-              </a:bodyPr>
-              <a:lstStyle/>
-              <a:p>
-                <a:r>
-                  <a:rPr lang="en-US" sz="7200" dirty="0" smtClean="0">
-                    <a:solidFill>
-                      <a:schemeClr val="accent3"/>
-                    </a:solidFill>
-                    <a:latin typeface="Yanone Kaffeesatz Regular" panose="02000000000000000000" pitchFamily="2" charset="0"/>
-                  </a:rPr>
-                  <a:t>interleaved</a:t>
-                </a:r>
-                <a:endParaRPr lang="en-US" sz="6000" dirty="0" smtClean="0">
-                  <a:solidFill>
-                    <a:schemeClr val="accent3"/>
-                  </a:solidFill>
-                  <a:latin typeface="Yanone Kaffeesatz Regular" panose="02000000000000000000" pitchFamily="2" charset="0"/>
-                </a:endParaRPr>
-              </a:p>
-            </p:txBody>
-          </p:sp>
-          <p:sp>
-            <p:nvSpPr>
-              <p:cNvPr id="8" name="Rectangle 7"/>
-              <p:cNvSpPr/>
-              <p:nvPr/>
-            </p:nvSpPr>
-            <p:spPr>
-              <a:xfrm>
-                <a:off x="6734791" y="2528561"/>
-                <a:ext cx="5447325" cy="1200329"/>
-              </a:xfrm>
-              <a:prstGeom prst="rect">
-                <a:avLst/>
-              </a:prstGeom>
-            </p:spPr>
-            <p:txBody>
-              <a:bodyPr wrap="none">
-                <a:spAutoFit/>
-              </a:bodyPr>
-              <a:lstStyle/>
-              <a:p>
-                <a:r>
-                  <a:rPr lang="en-US" sz="3600" dirty="0" smtClean="0">
-                    <a:solidFill>
-                      <a:schemeClr val="tx2"/>
-                    </a:solidFill>
-                    <a:latin typeface="Yanone Kaffeesatz Regular" panose="02000000000000000000" pitchFamily="2" charset="0"/>
-                  </a:rPr>
-                  <a:t>Work </a:t>
-                </a:r>
-                <a:r>
-                  <a:rPr lang="en-US" sz="3600" dirty="0" smtClean="0">
-                    <a:solidFill>
-                      <a:schemeClr val="accent4"/>
-                    </a:solidFill>
-                    <a:latin typeface="Yanone Kaffeesatz Regular" panose="02000000000000000000" pitchFamily="2" charset="0"/>
-                  </a:rPr>
-                  <a:t>can</a:t>
-                </a:r>
-                <a:r>
-                  <a:rPr lang="en-US" sz="3600" dirty="0" smtClean="0">
-                    <a:solidFill>
-                      <a:schemeClr val="tx2"/>
-                    </a:solidFill>
-                    <a:latin typeface="Yanone Kaffeesatz Regular" panose="02000000000000000000" pitchFamily="2" charset="0"/>
-                  </a:rPr>
-                  <a:t> be distributed over threads</a:t>
-                </a:r>
-              </a:p>
-              <a:p>
-                <a:r>
-                  <a:rPr lang="en-US" sz="3600" dirty="0" smtClean="0">
-                    <a:solidFill>
-                      <a:schemeClr val="tx2"/>
-                    </a:solidFill>
-                    <a:latin typeface="Yanone Kaffeesatz Regular" panose="02000000000000000000" pitchFamily="2" charset="0"/>
-                  </a:rPr>
-                  <a:t>and processors</a:t>
-                </a:r>
-              </a:p>
-            </p:txBody>
-          </p:sp>
-        </p:grpSp>
         <p:sp>
           <p:nvSpPr>
-            <p:cNvPr id="11" name="Rectangle 10"/>
+            <p:cNvPr id="2" name="Rectangle 1"/>
             <p:cNvSpPr/>
             <p:nvPr/>
           </p:nvSpPr>
           <p:spPr>
             <a:xfrm>
-              <a:off x="230185" y="3331644"/>
-              <a:ext cx="2488182" cy="923330"/>
+              <a:off x="588815" y="891253"/>
+              <a:ext cx="4999911" cy="2215991"/>
             </a:xfrm>
             <a:prstGeom prst="rect">
               <a:avLst/>
             </a:prstGeom>
           </p:spPr>
           <p:txBody>
-            <a:bodyPr wrap="none">
+            <a:bodyPr wrap="square">
               <a:spAutoFit/>
             </a:bodyPr>
             <a:lstStyle/>
             <a:p>
+              <a:pPr algn="ctr"/>
               <a:r>
-                <a:rPr lang="en-US" sz="5400" dirty="0" smtClean="0">
+                <a:rPr lang="en-US" sz="13800" dirty="0">
                   <a:solidFill>
-                    <a:schemeClr val="accent2"/>
+                    <a:schemeClr val="accent2">
+                      <a:alpha val="30000"/>
+                    </a:schemeClr>
                   </a:solidFill>
                   <a:latin typeface="Yanone Kaffeesatz Regular" panose="02000000000000000000" pitchFamily="2" charset="0"/>
                 </a:rPr>
-                <a:t>concurrent</a:t>
+                <a:t>parallel</a:t>
               </a:r>
-              <a:endParaRPr lang="de-CH" sz="1100" dirty="0"/>
+              <a:endParaRPr lang="de-CH" dirty="0">
+                <a:solidFill>
+                  <a:schemeClr val="accent2">
+                    <a:alpha val="30000"/>
+                  </a:schemeClr>
+                </a:solidFill>
+              </a:endParaRPr>
             </a:p>
           </p:txBody>
         </p:sp>
         <p:sp>
           <p:nvSpPr>
-            <p:cNvPr id="12" name="Rectangle 11"/>
+            <p:cNvPr id="3" name="Rectangle 2"/>
             <p:cNvSpPr/>
             <p:nvPr/>
           </p:nvSpPr>
           <p:spPr>
             <a:xfrm>
-              <a:off x="2809218" y="2408314"/>
-              <a:ext cx="2488182" cy="923330"/>
+              <a:off x="7074084" y="1145323"/>
+              <a:ext cx="5706729" cy="3416320"/>
             </a:xfrm>
             <a:prstGeom prst="rect">
               <a:avLst/>
             </a:prstGeom>
           </p:spPr>
           <p:txBody>
-            <a:bodyPr wrap="none">
+            <a:bodyPr wrap="square">
               <a:spAutoFit/>
             </a:bodyPr>
             <a:lstStyle/>
             <a:p>
               <a:r>
-                <a:rPr lang="en-US" sz="5400" dirty="0" smtClean="0">
+                <a:rPr lang="en-US" sz="3600" dirty="0">
                   <a:solidFill>
-                    <a:schemeClr val="accent2"/>
+                    <a:schemeClr val="tx2"/>
                   </a:solidFill>
                   <a:latin typeface="Yanone Kaffeesatz Regular" panose="02000000000000000000" pitchFamily="2" charset="0"/>
                 </a:rPr>
-                <a:t>concurrent</a:t>
+                <a:t>Multiple people sitting in cubicles</a:t>
               </a:r>
-              <a:endParaRPr lang="de-CH" sz="1100" dirty="0"/>
+              <a:br>
+                <a:rPr lang="en-US" sz="3600" dirty="0">
+                  <a:solidFill>
+                    <a:schemeClr val="tx2"/>
+                  </a:solidFill>
+                  <a:latin typeface="Yanone Kaffeesatz Regular" panose="02000000000000000000" pitchFamily="2" charset="0"/>
+                </a:rPr>
+              </a:br>
+              <a:r>
+                <a:rPr lang="en-US" sz="3600" dirty="0">
+                  <a:solidFill>
+                    <a:schemeClr val="tx2"/>
+                  </a:solidFill>
+                  <a:latin typeface="Yanone Kaffeesatz Regular" panose="02000000000000000000" pitchFamily="2" charset="0"/>
+                </a:rPr>
+                <a:t> working on a project</a:t>
+              </a:r>
+            </a:p>
+            <a:p>
+              <a:endParaRPr lang="en-US" sz="3600" dirty="0">
+                <a:solidFill>
+                  <a:schemeClr val="tx2"/>
+                </a:solidFill>
+                <a:latin typeface="Yanone Kaffeesatz Regular" panose="02000000000000000000" pitchFamily="2" charset="0"/>
+              </a:endParaRPr>
+            </a:p>
+            <a:p>
+              <a:endParaRPr lang="en-US" sz="3600" dirty="0">
+                <a:solidFill>
+                  <a:schemeClr val="tx2"/>
+                </a:solidFill>
+                <a:latin typeface="Yanone Kaffeesatz Regular" panose="02000000000000000000" pitchFamily="2" charset="0"/>
+              </a:endParaRPr>
+            </a:p>
+            <a:p>
+              <a:r>
+                <a:rPr lang="en-US" sz="3600" dirty="0">
+                  <a:solidFill>
+                    <a:schemeClr val="tx2"/>
+                  </a:solidFill>
+                  <a:latin typeface="Yanone Kaffeesatz Regular" panose="02000000000000000000" pitchFamily="2" charset="0"/>
+                </a:rPr>
+                <a:t>Work </a:t>
+              </a:r>
+              <a:r>
+                <a:rPr lang="en-US" sz="3600" dirty="0">
+                  <a:solidFill>
+                    <a:schemeClr val="accent4"/>
+                  </a:solidFill>
+                  <a:latin typeface="Yanone Kaffeesatz Regular" panose="02000000000000000000" pitchFamily="2" charset="0"/>
+                </a:rPr>
+                <a:t>is</a:t>
+              </a:r>
+              <a:r>
+                <a:rPr lang="en-US" sz="3600" dirty="0">
+                  <a:solidFill>
+                    <a:schemeClr val="tx2"/>
+                  </a:solidFill>
+                  <a:latin typeface="Yanone Kaffeesatz Regular" panose="02000000000000000000" pitchFamily="2" charset="0"/>
+                </a:rPr>
+                <a:t> distributed over threads</a:t>
+              </a:r>
+            </a:p>
+            <a:p>
+              <a:r>
+                <a:rPr lang="en-US" sz="3600" dirty="0">
+                  <a:solidFill>
+                    <a:schemeClr val="tx2"/>
+                  </a:solidFill>
+                  <a:latin typeface="Yanone Kaffeesatz Regular" panose="02000000000000000000" pitchFamily="2" charset="0"/>
+                </a:rPr>
+                <a:t>and processors</a:t>
+              </a:r>
             </a:p>
           </p:txBody>
         </p:sp>
         <p:sp>
           <p:nvSpPr>
-            <p:cNvPr id="13" name="Rectangle 12"/>
+            <p:cNvPr id="6" name="Rectangle 5"/>
             <p:cNvSpPr/>
             <p:nvPr/>
           </p:nvSpPr>
           <p:spPr>
-            <a:xfrm>
-              <a:off x="1627745" y="1417336"/>
-              <a:ext cx="2488182" cy="923330"/>
+            <a:xfrm rot="16200000">
+              <a:off x="2707390" y="2302752"/>
+              <a:ext cx="6858001" cy="1200329"/>
             </a:xfrm>
             <a:prstGeom prst="rect">
               <a:avLst/>
             </a:prstGeom>
           </p:spPr>
           <p:txBody>
-            <a:bodyPr wrap="none">
+            <a:bodyPr wrap="square">
               <a:spAutoFit/>
             </a:bodyPr>
             <a:lstStyle/>
             <a:p>
+              <a:pPr algn="ctr"/>
               <a:r>
-                <a:rPr lang="en-US" sz="5400" dirty="0" smtClean="0">
+                <a:rPr lang="en-US" sz="7200" dirty="0">
                   <a:solidFill>
-                    <a:schemeClr val="accent2"/>
+                    <a:schemeClr val="accent3"/>
                   </a:solidFill>
                   <a:latin typeface="Yanone Kaffeesatz Regular" panose="02000000000000000000" pitchFamily="2" charset="0"/>
                 </a:rPr>
-                <a:t>concurrent</a:t>
+                <a:t>simultaneous</a:t>
               </a:r>
-              <a:endParaRPr lang="de-CH" sz="1100" dirty="0"/>
             </a:p>
           </p:txBody>
         </p:sp>
         <p:sp>
           <p:nvSpPr>
-            <p:cNvPr id="14" name="Rectangle 13"/>
+            <p:cNvPr id="7" name="Rectangle 6"/>
             <p:cNvSpPr/>
             <p:nvPr/>
           </p:nvSpPr>
           <p:spPr>
             <a:xfrm>
-              <a:off x="534985" y="2298522"/>
-              <a:ext cx="2488182" cy="923330"/>
+              <a:off x="588815" y="2698589"/>
+              <a:ext cx="4999912" cy="2215991"/>
             </a:xfrm>
             <a:prstGeom prst="rect">
               <a:avLst/>
             </a:prstGeom>
           </p:spPr>
           <p:txBody>
-            <a:bodyPr wrap="none">
+            <a:bodyPr wrap="square">
               <a:spAutoFit/>
             </a:bodyPr>
             <a:lstStyle/>
             <a:p>
+              <a:pPr algn="ctr"/>
               <a:r>
-                <a:rPr lang="en-US" sz="5400" dirty="0" smtClean="0">
+                <a:rPr lang="en-US" sz="13800" dirty="0">
                   <a:solidFill>
                     <a:schemeClr val="accent2"/>
                   </a:solidFill>
                   <a:latin typeface="Yanone Kaffeesatz Regular" panose="02000000000000000000" pitchFamily="2" charset="0"/>
                 </a:rPr>
-                <a:t>concurrent</a:t>
+                <a:t>parallel</a:t>
               </a:r>
-              <a:endParaRPr lang="de-CH" sz="1100" dirty="0"/>
+              <a:endParaRPr lang="de-CH" dirty="0"/>
             </a:p>
           </p:txBody>
         </p:sp>
         <p:sp>
           <p:nvSpPr>
-            <p:cNvPr id="15" name="Rectangle 14"/>
+            <p:cNvPr id="8" name="Rectangle 7"/>
             <p:cNvSpPr/>
             <p:nvPr/>
           </p:nvSpPr>
           <p:spPr>
             <a:xfrm>
-              <a:off x="2803822" y="3120734"/>
-              <a:ext cx="2488182" cy="923330"/>
+              <a:off x="6981751" y="3388321"/>
+              <a:ext cx="5799062" cy="646331"/>
             </a:xfrm>
             <a:prstGeom prst="rect">
               <a:avLst/>
             </a:prstGeom>
           </p:spPr>
           <p:txBody>
-            <a:bodyPr wrap="none">
+            <a:bodyPr wrap="square">
               <a:spAutoFit/>
             </a:bodyPr>
             <a:lstStyle/>
             <a:p>
-              <a:r>
-                <a:rPr lang="en-US" sz="5400" dirty="0" smtClean="0">
-                  <a:solidFill>
-                    <a:schemeClr val="accent2"/>
-                  </a:solidFill>
-                  <a:latin typeface="Yanone Kaffeesatz Regular" panose="02000000000000000000" pitchFamily="2" charset="0"/>
-                </a:rPr>
-                <a:t>concurrent</a:t>
-              </a:r>
-              <a:endParaRPr lang="de-CH" sz="1100" dirty="0"/>
+              <a:endParaRPr lang="en-US" sz="3600" dirty="0">
+                <a:solidFill>
+                  <a:schemeClr val="tx2"/>
+                </a:solidFill>
+                <a:latin typeface="Yanone Kaffeesatz Regular" panose="02000000000000000000" pitchFamily="2" charset="0"/>
+              </a:endParaRPr>
             </a:p>
           </p:txBody>
         </p:sp>
@@ -4724,7 +5544,7 @@
     </p:spTree>
     <p:extLst>
       <p:ext uri="{BB962C8B-B14F-4D97-AF65-F5344CB8AC3E}">
-        <p14:creationId xmlns:p14="http://schemas.microsoft.com/office/powerpoint/2010/main" val="4061003116"/>
+        <p14:creationId xmlns:p14="http://schemas.microsoft.com/office/powerpoint/2010/main" val="403767496"/>
       </p:ext>
     </p:extLst>
   </p:cSld>
@@ -4751,30 +5571,286 @@
           <a:chExt cx="0" cy="0"/>
         </a:xfrm>
       </p:grpSpPr>
+      <p:sp>
+        <p:nvSpPr>
+          <p:cNvPr id="18" name="Rectangle 17"/>
+          <p:cNvSpPr/>
+          <p:nvPr/>
+        </p:nvSpPr>
+        <p:spPr>
+          <a:xfrm>
+            <a:off x="6485270" y="1671407"/>
+            <a:ext cx="5706729" cy="3416320"/>
+          </a:xfrm>
+          <a:prstGeom prst="rect">
+            <a:avLst/>
+          </a:prstGeom>
+        </p:spPr>
+        <p:txBody>
+          <a:bodyPr wrap="square">
+            <a:spAutoFit/>
+          </a:bodyPr>
+          <a:lstStyle/>
+          <a:p>
+            <a:r>
+              <a:rPr lang="en-US" sz="3600" dirty="0">
+                <a:solidFill>
+                  <a:schemeClr val="tx2"/>
+                </a:solidFill>
+                <a:latin typeface="Yanone Kaffeesatz Regular" panose="02000000000000000000" pitchFamily="2" charset="0"/>
+              </a:rPr>
+              <a:t>A person juggling multiple balls</a:t>
+            </a:r>
+            <a:br>
+              <a:rPr lang="en-US" sz="3600" dirty="0">
+                <a:solidFill>
+                  <a:schemeClr val="tx2"/>
+                </a:solidFill>
+                <a:latin typeface="Yanone Kaffeesatz Regular" panose="02000000000000000000" pitchFamily="2" charset="0"/>
+              </a:rPr>
+            </a:br>
+            <a:r>
+              <a:rPr lang="en-US" sz="3600" dirty="0">
+                <a:solidFill>
+                  <a:schemeClr val="tx2"/>
+                </a:solidFill>
+                <a:latin typeface="Yanone Kaffeesatz Regular" panose="02000000000000000000" pitchFamily="2" charset="0"/>
+              </a:rPr>
+              <a:t>concurrently</a:t>
+            </a:r>
+          </a:p>
+          <a:p>
+            <a:endParaRPr lang="en-US" sz="3600" dirty="0">
+              <a:solidFill>
+                <a:schemeClr val="tx2"/>
+              </a:solidFill>
+              <a:latin typeface="Yanone Kaffeesatz Regular" panose="02000000000000000000" pitchFamily="2" charset="0"/>
+            </a:endParaRPr>
+          </a:p>
+          <a:p>
+            <a:endParaRPr lang="en-US" sz="3600" dirty="0">
+              <a:solidFill>
+                <a:schemeClr val="tx2"/>
+              </a:solidFill>
+              <a:latin typeface="Yanone Kaffeesatz Regular" panose="02000000000000000000" pitchFamily="2" charset="0"/>
+            </a:endParaRPr>
+          </a:p>
+          <a:p>
+            <a:r>
+              <a:rPr lang="en-US" sz="3600" dirty="0">
+                <a:solidFill>
+                  <a:schemeClr val="tx2"/>
+                </a:solidFill>
+                <a:latin typeface="Yanone Kaffeesatz Regular" panose="02000000000000000000" pitchFamily="2" charset="0"/>
+              </a:rPr>
+              <a:t>Work </a:t>
+            </a:r>
+            <a:r>
+              <a:rPr lang="en-US" sz="3600" dirty="0">
+                <a:solidFill>
+                  <a:schemeClr val="accent4"/>
+                </a:solidFill>
+                <a:latin typeface="Yanone Kaffeesatz Regular" panose="02000000000000000000" pitchFamily="2" charset="0"/>
+              </a:rPr>
+              <a:t>can</a:t>
+            </a:r>
+            <a:r>
+              <a:rPr lang="en-US" sz="3600" dirty="0">
+                <a:solidFill>
+                  <a:schemeClr val="tx2"/>
+                </a:solidFill>
+                <a:latin typeface="Yanone Kaffeesatz Regular" panose="02000000000000000000" pitchFamily="2" charset="0"/>
+              </a:rPr>
+              <a:t> be distributed over threads</a:t>
+            </a:r>
+          </a:p>
+          <a:p>
+            <a:r>
+              <a:rPr lang="en-US" sz="3600" dirty="0">
+                <a:solidFill>
+                  <a:schemeClr val="tx2"/>
+                </a:solidFill>
+                <a:latin typeface="Yanone Kaffeesatz Regular" panose="02000000000000000000" pitchFamily="2" charset="0"/>
+              </a:rPr>
+              <a:t>and processors</a:t>
+            </a:r>
+          </a:p>
+        </p:txBody>
+      </p:sp>
+      <p:sp>
+        <p:nvSpPr>
+          <p:cNvPr id="17" name="Rectangle 16"/>
+          <p:cNvSpPr/>
+          <p:nvPr/>
+        </p:nvSpPr>
+        <p:spPr>
+          <a:xfrm>
+            <a:off x="0" y="3604928"/>
+            <a:ext cx="4999912" cy="1569660"/>
+          </a:xfrm>
+          <a:prstGeom prst="rect">
+            <a:avLst/>
+          </a:prstGeom>
+        </p:spPr>
+        <p:txBody>
+          <a:bodyPr wrap="square">
+            <a:spAutoFit/>
+          </a:bodyPr>
+          <a:lstStyle/>
+          <a:p>
+            <a:pPr algn="ctr"/>
+            <a:r>
+              <a:rPr lang="en-US" sz="9600" dirty="0">
+                <a:solidFill>
+                  <a:schemeClr val="accent2"/>
+                </a:solidFill>
+                <a:latin typeface="Yanone Kaffeesatz Regular" panose="02000000000000000000" pitchFamily="2" charset="0"/>
+              </a:rPr>
+              <a:t>concurrent</a:t>
+            </a:r>
+            <a:endParaRPr lang="de-CH" sz="1400" dirty="0"/>
+          </a:p>
+        </p:txBody>
+      </p:sp>
       <p:grpSp>
         <p:nvGrpSpPr>
-          <p:cNvPr id="9" name="Group 8"/>
+          <p:cNvPr id="4" name="Group 3"/>
           <p:cNvGrpSpPr/>
           <p:nvPr/>
         </p:nvGrpSpPr>
         <p:grpSpPr>
           <a:xfrm>
-            <a:off x="1320870" y="1523671"/>
-            <a:ext cx="9550260" cy="3810659"/>
-            <a:chOff x="1704361" y="710420"/>
-            <a:chExt cx="9550260" cy="3810659"/>
+            <a:off x="-502208" y="0"/>
+            <a:ext cx="6822873" cy="6858001"/>
+            <a:chOff x="-675129" y="-990808"/>
+            <a:chExt cx="6822873" cy="6858001"/>
           </a:xfrm>
         </p:grpSpPr>
+        <p:grpSp>
+          <p:nvGrpSpPr>
+            <p:cNvPr id="9" name="Group 8"/>
+            <p:cNvGrpSpPr/>
+            <p:nvPr/>
+          </p:nvGrpSpPr>
+          <p:grpSpPr>
+            <a:xfrm>
+              <a:off x="-675129" y="-990808"/>
+              <a:ext cx="6822873" cy="6858001"/>
+              <a:chOff x="-86315" y="-1516892"/>
+              <a:chExt cx="6822873" cy="6858001"/>
+            </a:xfrm>
+          </p:grpSpPr>
+          <p:sp>
+            <p:nvSpPr>
+              <p:cNvPr id="3" name="Rectangle 2"/>
+              <p:cNvSpPr/>
+              <p:nvPr/>
+            </p:nvSpPr>
+            <p:spPr>
+              <a:xfrm>
+                <a:off x="-86315" y="3973465"/>
+                <a:ext cx="184731" cy="646331"/>
+              </a:xfrm>
+              <a:prstGeom prst="rect">
+                <a:avLst/>
+              </a:prstGeom>
+            </p:spPr>
+            <p:txBody>
+              <a:bodyPr wrap="none">
+                <a:spAutoFit/>
+              </a:bodyPr>
+              <a:lstStyle/>
+              <a:p>
+                <a:endParaRPr lang="en-US" sz="3600" dirty="0">
+                  <a:solidFill>
+                    <a:schemeClr val="tx2"/>
+                  </a:solidFill>
+                  <a:latin typeface="Yanone Kaffeesatz Regular" panose="02000000000000000000" pitchFamily="2" charset="0"/>
+                </a:endParaRPr>
+              </a:p>
+            </p:txBody>
+          </p:sp>
+          <p:sp>
+            <p:nvSpPr>
+              <p:cNvPr id="6" name="Rectangle 5"/>
+              <p:cNvSpPr/>
+              <p:nvPr/>
+            </p:nvSpPr>
+            <p:spPr>
+              <a:xfrm rot="16200000">
+                <a:off x="2707393" y="1311944"/>
+                <a:ext cx="6858001" cy="1200329"/>
+              </a:xfrm>
+              <a:prstGeom prst="rect">
+                <a:avLst/>
+              </a:prstGeom>
+            </p:spPr>
+            <p:txBody>
+              <a:bodyPr wrap="square">
+                <a:spAutoFit/>
+              </a:bodyPr>
+              <a:lstStyle/>
+              <a:p>
+                <a:pPr algn="ctr"/>
+                <a:r>
+                  <a:rPr lang="en-US" sz="7200" dirty="0">
+                    <a:solidFill>
+                      <a:schemeClr val="accent3"/>
+                    </a:solidFill>
+                    <a:latin typeface="Yanone Kaffeesatz Regular" panose="02000000000000000000" pitchFamily="2" charset="0"/>
+                  </a:rPr>
+                  <a:t>interleaved</a:t>
+                </a:r>
+                <a:endParaRPr lang="en-US" sz="6000" dirty="0">
+                  <a:solidFill>
+                    <a:schemeClr val="accent3"/>
+                  </a:solidFill>
+                  <a:latin typeface="Yanone Kaffeesatz Regular" panose="02000000000000000000" pitchFamily="2" charset="0"/>
+                </a:endParaRPr>
+              </a:p>
+            </p:txBody>
+          </p:sp>
+          <p:sp>
+            <p:nvSpPr>
+              <p:cNvPr id="8" name="Rectangle 7"/>
+              <p:cNvSpPr/>
+              <p:nvPr/>
+            </p:nvSpPr>
+            <p:spPr>
+              <a:xfrm>
+                <a:off x="4507091" y="3973465"/>
+                <a:ext cx="184731" cy="646331"/>
+              </a:xfrm>
+              <a:prstGeom prst="rect">
+                <a:avLst/>
+              </a:prstGeom>
+            </p:spPr>
+            <p:txBody>
+              <a:bodyPr wrap="none">
+                <a:spAutoFit/>
+              </a:bodyPr>
+              <a:lstStyle/>
+              <a:p>
+                <a:endParaRPr lang="en-US" sz="3600" dirty="0">
+                  <a:solidFill>
+                    <a:schemeClr val="tx2"/>
+                  </a:solidFill>
+                  <a:latin typeface="Yanone Kaffeesatz Regular" panose="02000000000000000000" pitchFamily="2" charset="0"/>
+                </a:endParaRPr>
+              </a:p>
+            </p:txBody>
+          </p:sp>
+        </p:grpSp>
         <p:sp>
           <p:nvSpPr>
-            <p:cNvPr id="2" name="Rectangle 1"/>
+            <p:cNvPr id="11" name="Rectangle 10"/>
             <p:cNvSpPr/>
             <p:nvPr/>
           </p:nvSpPr>
           <p:spPr>
             <a:xfrm>
-              <a:off x="1704361" y="1016076"/>
-              <a:ext cx="3910045" cy="2646878"/>
+              <a:off x="253747" y="682217"/>
+              <a:ext cx="2488182" cy="923330"/>
             </a:xfrm>
             <a:prstGeom prst="rect">
               <a:avLst/>
@@ -4787,28 +5863,36 @@
             <a:lstStyle/>
             <a:p>
               <a:r>
-                <a:rPr lang="en-US" sz="16600" dirty="0" err="1" smtClean="0">
+                <a:rPr lang="en-US" sz="5400" dirty="0">
                   <a:solidFill>
-                    <a:schemeClr val="accent2"/>
+                    <a:schemeClr val="accent2">
+                      <a:alpha val="30000"/>
+                    </a:schemeClr>
                   </a:solidFill>
                   <a:latin typeface="Yanone Kaffeesatz Regular" panose="02000000000000000000" pitchFamily="2" charset="0"/>
                 </a:rPr>
-                <a:t>async</a:t>
+                <a:t>concurrent</a:t>
               </a:r>
-              <a:endParaRPr lang="de-CH" dirty="0"/>
+              <a:endParaRPr lang="de-CH" sz="1100" dirty="0">
+                <a:solidFill>
+                  <a:schemeClr val="accent2">
+                    <a:alpha val="30000"/>
+                  </a:schemeClr>
+                </a:solidFill>
+              </a:endParaRPr>
             </a:p>
           </p:txBody>
         </p:sp>
         <p:sp>
           <p:nvSpPr>
-            <p:cNvPr id="3" name="Rectangle 2"/>
+            <p:cNvPr id="12" name="Rectangle 11"/>
             <p:cNvSpPr/>
             <p:nvPr/>
           </p:nvSpPr>
           <p:spPr>
             <a:xfrm>
-              <a:off x="6784719" y="1139186"/>
-              <a:ext cx="3983783" cy="1200329"/>
+              <a:off x="2459232" y="2110140"/>
+              <a:ext cx="2488182" cy="923330"/>
             </a:xfrm>
             <a:prstGeom prst="rect">
               <a:avLst/>
@@ -4821,44 +5905,36 @@
             <a:lstStyle/>
             <a:p>
               <a:r>
-                <a:rPr lang="en-US" sz="3600" dirty="0" smtClean="0">
+                <a:rPr lang="en-US" sz="5400" dirty="0">
                   <a:solidFill>
-                    <a:schemeClr val="tx2"/>
+                    <a:schemeClr val="accent2">
+                      <a:alpha val="30000"/>
+                    </a:schemeClr>
                   </a:solidFill>
                   <a:latin typeface="Yanone Kaffeesatz Regular" panose="02000000000000000000" pitchFamily="2" charset="0"/>
                 </a:rPr>
-                <a:t>Reading a book while doing</a:t>
+                <a:t>concurrent</a:t>
               </a:r>
-              <a:br>
-                <a:rPr lang="en-US" sz="3600" dirty="0" smtClean="0">
-                  <a:solidFill>
-                    <a:schemeClr val="tx2"/>
-                  </a:solidFill>
-                  <a:latin typeface="Yanone Kaffeesatz Regular" panose="02000000000000000000" pitchFamily="2" charset="0"/>
-                </a:rPr>
-              </a:br>
-              <a:r>
-                <a:rPr lang="en-US" sz="3600" dirty="0" smtClean="0">
-                  <a:solidFill>
-                    <a:schemeClr val="tx2"/>
-                  </a:solidFill>
-                  <a:latin typeface="Yanone Kaffeesatz Regular" panose="02000000000000000000" pitchFamily="2" charset="0"/>
-                </a:rPr>
-                <a:t>the laundry</a:t>
-              </a:r>
+              <a:endParaRPr lang="de-CH" sz="1100" dirty="0">
+                <a:solidFill>
+                  <a:schemeClr val="accent2">
+                    <a:alpha val="30000"/>
+                  </a:schemeClr>
+                </a:solidFill>
+              </a:endParaRPr>
             </a:p>
           </p:txBody>
         </p:sp>
         <p:sp>
           <p:nvSpPr>
-            <p:cNvPr id="6" name="Rectangle 5"/>
+            <p:cNvPr id="13" name="Rectangle 12"/>
             <p:cNvSpPr/>
             <p:nvPr/>
           </p:nvSpPr>
           <p:spPr>
-            <a:xfrm rot="16200000">
-              <a:off x="4231544" y="2015585"/>
-              <a:ext cx="3810659" cy="1200329"/>
+            <a:xfrm>
+              <a:off x="1627745" y="1417336"/>
+              <a:ext cx="2488182" cy="923330"/>
             </a:xfrm>
             <a:prstGeom prst="rect">
               <a:avLst/>
@@ -4871,36 +5947,36 @@
             <a:lstStyle/>
             <a:p>
               <a:r>
-                <a:rPr lang="en-US" sz="7200" dirty="0">
+                <a:rPr lang="en-US" sz="5400" dirty="0">
                   <a:solidFill>
-                    <a:schemeClr val="accent3"/>
+                    <a:schemeClr val="accent2">
+                      <a:alpha val="30000"/>
+                    </a:schemeClr>
                   </a:solidFill>
                   <a:latin typeface="Yanone Kaffeesatz Regular" panose="02000000000000000000" pitchFamily="2" charset="0"/>
                 </a:rPr>
-                <a:t>e</a:t>
+                <a:t>concurrent</a:t>
               </a:r>
-              <a:r>
-                <a:rPr lang="en-US" sz="7200" dirty="0" smtClean="0">
-                  <a:solidFill>
-                    <a:schemeClr val="accent3"/>
-                  </a:solidFill>
-                  <a:latin typeface="Yanone Kaffeesatz Regular" panose="02000000000000000000" pitchFamily="2" charset="0"/>
-                </a:rPr>
-                <a:t>vent-driven</a:t>
-              </a:r>
+              <a:endParaRPr lang="de-CH" sz="1100" dirty="0">
+                <a:solidFill>
+                  <a:schemeClr val="accent2">
+                    <a:alpha val="30000"/>
+                  </a:schemeClr>
+                </a:solidFill>
+              </a:endParaRPr>
             </a:p>
           </p:txBody>
         </p:sp>
         <p:sp>
           <p:nvSpPr>
-            <p:cNvPr id="8" name="Rectangle 7"/>
+            <p:cNvPr id="14" name="Rectangle 13"/>
             <p:cNvSpPr/>
             <p:nvPr/>
           </p:nvSpPr>
           <p:spPr>
             <a:xfrm>
-              <a:off x="6737038" y="3320750"/>
-              <a:ext cx="4517583" cy="1200329"/>
+              <a:off x="253747" y="2298351"/>
+              <a:ext cx="2488182" cy="923330"/>
             </a:xfrm>
             <a:prstGeom prst="rect">
               <a:avLst/>
@@ -4913,49 +5989,23 @@
             <a:lstStyle/>
             <a:p>
               <a:r>
-                <a:rPr lang="en-US" sz="3600" dirty="0" smtClean="0">
+                <a:rPr lang="en-US" sz="5400" dirty="0">
                   <a:solidFill>
-                    <a:schemeClr val="tx2"/>
+                    <a:schemeClr val="accent2">
+                      <a:alpha val="30000"/>
+                    </a:schemeClr>
                   </a:solidFill>
                   <a:latin typeface="Yanone Kaffeesatz Regular" panose="02000000000000000000" pitchFamily="2" charset="0"/>
                 </a:rPr>
-                <a:t>Worker is </a:t>
+                <a:t>concurrent</a:t>
               </a:r>
-              <a:r>
-                <a:rPr lang="en-US" sz="3600" dirty="0" smtClean="0">
-                  <a:solidFill>
-                    <a:schemeClr val="accent4"/>
-                  </a:solidFill>
-                  <a:latin typeface="Yanone Kaffeesatz Regular" panose="02000000000000000000" pitchFamily="2" charset="0"/>
-                </a:rPr>
-                <a:t>free</a:t>
-              </a:r>
-              <a:r>
-                <a:rPr lang="en-US" sz="3600" dirty="0" smtClean="0">
-                  <a:solidFill>
-                    <a:schemeClr val="tx2"/>
-                  </a:solidFill>
-                  <a:latin typeface="Yanone Kaffeesatz Regular" panose="02000000000000000000" pitchFamily="2" charset="0"/>
-                </a:rPr>
-                <a:t> until signal</a:t>
-              </a:r>
-              <a:br>
-                <a:rPr lang="en-US" sz="3600" dirty="0" smtClean="0">
-                  <a:solidFill>
-                    <a:schemeClr val="tx2"/>
-                  </a:solidFill>
-                  <a:latin typeface="Yanone Kaffeesatz Regular" panose="02000000000000000000" pitchFamily="2" charset="0"/>
-                </a:rPr>
-              </a:br>
-              <a:r>
-                <a:rPr lang="en-US" sz="3600" dirty="0" smtClean="0">
-                  <a:solidFill>
-                    <a:schemeClr val="tx2"/>
-                  </a:solidFill>
-                  <a:latin typeface="Yanone Kaffeesatz Regular" panose="02000000000000000000" pitchFamily="2" charset="0"/>
-                </a:rPr>
-                <a:t>indicates external task is done</a:t>
-              </a:r>
+              <a:endParaRPr lang="de-CH" sz="1100" dirty="0">
+                <a:solidFill>
+                  <a:schemeClr val="accent2">
+                    <a:alpha val="30000"/>
+                  </a:schemeClr>
+                </a:solidFill>
+              </a:endParaRPr>
             </a:p>
           </p:txBody>
         </p:sp>
@@ -4963,7 +6013,7 @@
     </p:spTree>
     <p:extLst>
       <p:ext uri="{BB962C8B-B14F-4D97-AF65-F5344CB8AC3E}">
-        <p14:creationId xmlns:p14="http://schemas.microsoft.com/office/powerpoint/2010/main" val="3955367951"/>
+        <p14:creationId xmlns:p14="http://schemas.microsoft.com/office/powerpoint/2010/main" val="4061003116"/>
       </p:ext>
     </p:extLst>
   </p:cSld>
@@ -4990,35 +6040,145 @@
           <a:chExt cx="0" cy="0"/>
         </a:xfrm>
       </p:grpSpPr>
-      <p:sp>
-        <p:nvSpPr>
-          <p:cNvPr id="2" name="Rectangle 1"/>
+      <p:grpSp>
+        <p:nvGrpSpPr>
+          <p:cNvPr id="9" name="Group 8"/>
+          <p:cNvGrpSpPr/>
+          <p:nvPr/>
+        </p:nvGrpSpPr>
+        <p:grpSpPr>
+          <a:xfrm>
+            <a:off x="239767" y="1"/>
+            <a:ext cx="6113781" cy="6858000"/>
+            <a:chOff x="623258" y="-813250"/>
+            <a:chExt cx="6113781" cy="6858000"/>
+          </a:xfrm>
+        </p:grpSpPr>
+        <p:sp>
+          <p:nvSpPr>
+            <p:cNvPr id="3" name="Rectangle 2"/>
+            <p:cNvSpPr/>
+            <p:nvPr/>
+          </p:nvSpPr>
+          <p:spPr>
+            <a:xfrm>
+              <a:off x="623258" y="5005441"/>
+              <a:ext cx="184731" cy="646331"/>
+            </a:xfrm>
+            <a:prstGeom prst="rect">
+              <a:avLst/>
+            </a:prstGeom>
+          </p:spPr>
+          <p:txBody>
+            <a:bodyPr wrap="none">
+              <a:spAutoFit/>
+            </a:bodyPr>
+            <a:lstStyle/>
+            <a:p>
+              <a:endParaRPr lang="en-US" sz="3600" dirty="0">
+                <a:solidFill>
+                  <a:schemeClr val="tx2"/>
+                </a:solidFill>
+                <a:latin typeface="Yanone Kaffeesatz Regular" panose="02000000000000000000" pitchFamily="2" charset="0"/>
+              </a:endParaRPr>
+            </a:p>
+          </p:txBody>
+        </p:sp>
+        <p:sp>
+          <p:nvSpPr>
+            <p:cNvPr id="6" name="Rectangle 5"/>
+            <p:cNvSpPr/>
+            <p:nvPr/>
+          </p:nvSpPr>
+          <p:spPr>
+            <a:xfrm rot="16200000">
+              <a:off x="2707875" y="2015585"/>
+              <a:ext cx="6858000" cy="1200329"/>
+            </a:xfrm>
+            <a:prstGeom prst="rect">
+              <a:avLst/>
+            </a:prstGeom>
+          </p:spPr>
+          <p:txBody>
+            <a:bodyPr wrap="square">
+              <a:spAutoFit/>
+            </a:bodyPr>
+            <a:lstStyle/>
+            <a:p>
+              <a:pPr algn="ctr"/>
+              <a:r>
+                <a:rPr lang="en-US" sz="7200" dirty="0">
+                  <a:solidFill>
+                    <a:schemeClr val="accent3"/>
+                  </a:solidFill>
+                  <a:latin typeface="Yanone Kaffeesatz Regular" panose="02000000000000000000" pitchFamily="2" charset="0"/>
+                </a:rPr>
+                <a:t>event-driven</a:t>
+              </a:r>
+            </a:p>
+          </p:txBody>
+        </p:sp>
+        <p:sp>
+          <p:nvSpPr>
+            <p:cNvPr id="8" name="Rectangle 7"/>
+            <p:cNvSpPr/>
+            <p:nvPr/>
+          </p:nvSpPr>
+          <p:spPr>
+            <a:xfrm>
+              <a:off x="5945376" y="5057496"/>
+              <a:ext cx="184731" cy="646331"/>
+            </a:xfrm>
+            <a:prstGeom prst="rect">
+              <a:avLst/>
+            </a:prstGeom>
+          </p:spPr>
+          <p:txBody>
+            <a:bodyPr wrap="none">
+              <a:spAutoFit/>
+            </a:bodyPr>
+            <a:lstStyle/>
+            <a:p>
+              <a:endParaRPr lang="en-US" sz="3600" dirty="0">
+                <a:solidFill>
+                  <a:schemeClr val="tx2"/>
+                </a:solidFill>
+                <a:latin typeface="Yanone Kaffeesatz Regular" panose="02000000000000000000" pitchFamily="2" charset="0"/>
+              </a:endParaRPr>
+            </a:p>
+          </p:txBody>
+        </p:sp>
+      </p:grpSp>
+      <p:sp>
+        <p:nvSpPr>
+          <p:cNvPr id="7" name="Rectangle 6"/>
           <p:cNvSpPr/>
           <p:nvPr/>
         </p:nvSpPr>
         <p:spPr>
           <a:xfrm>
-            <a:off x="633182" y="1829327"/>
-            <a:ext cx="4690708" cy="2646878"/>
+            <a:off x="0" y="1952437"/>
+            <a:ext cx="4999912" cy="2646878"/>
           </a:xfrm>
           <a:prstGeom prst="rect">
             <a:avLst/>
           </a:prstGeom>
         </p:spPr>
         <p:txBody>
-          <a:bodyPr wrap="none">
+          <a:bodyPr wrap="square">
             <a:spAutoFit/>
           </a:bodyPr>
           <a:lstStyle/>
           <a:p>
-            <a:r>
-              <a:rPr lang="en-US" sz="16600" dirty="0" smtClean="0">
+            <a:pPr algn="ctr"/>
+            <a:r>
+              <a:rPr lang="en-US" sz="16600" dirty="0" err="1">
                 <a:solidFill>
                   <a:schemeClr val="accent2"/>
                 </a:solidFill>
                 <a:latin typeface="Yanone Kaffeesatz Regular" panose="02000000000000000000" pitchFamily="2" charset="0"/>
               </a:rPr>
-              <a:t>Thread</a:t>
+              <a:t>async</a:t>
             </a:r>
             <a:endParaRPr lang="de-CH" dirty="0"/>
           </a:p>
@@ -5026,54 +6186,36 @@
       </p:sp>
       <p:sp>
         <p:nvSpPr>
-          <p:cNvPr id="3" name="Rectangle 2"/>
+          <p:cNvPr id="10" name="Rectangle 9"/>
           <p:cNvSpPr/>
           <p:nvPr/>
         </p:nvSpPr>
         <p:spPr>
           <a:xfrm>
-            <a:off x="5690867" y="2275603"/>
-            <a:ext cx="6159058" cy="1754326"/>
+            <a:off x="6485270" y="1671407"/>
+            <a:ext cx="5706729" cy="3416320"/>
           </a:xfrm>
           <a:prstGeom prst="rect">
             <a:avLst/>
           </a:prstGeom>
         </p:spPr>
         <p:txBody>
-          <a:bodyPr wrap="none">
+          <a:bodyPr wrap="square">
             <a:spAutoFit/>
           </a:bodyPr>
           <a:lstStyle/>
           <a:p>
             <a:r>
-              <a:rPr lang="en-US" sz="3600" dirty="0" smtClean="0">
+              <a:rPr lang="en-US" sz="3600" dirty="0">
                 <a:solidFill>
                   <a:schemeClr val="tx2"/>
                 </a:solidFill>
                 <a:latin typeface="Yanone Kaffeesatz Regular" panose="02000000000000000000" pitchFamily="2" charset="0"/>
               </a:rPr>
-              <a:t>One of many possible </a:t>
-            </a:r>
-            <a:r>
-              <a:rPr lang="en-US" sz="3600" dirty="0" smtClean="0">
-                <a:solidFill>
-                  <a:schemeClr val="accent4"/>
-                </a:solidFill>
-                <a:latin typeface="Yanone Kaffeesatz Regular" panose="02000000000000000000" pitchFamily="2" charset="0"/>
-              </a:rPr>
-              <a:t>worker</a:t>
-            </a:r>
-            <a:r>
-              <a:rPr lang="en-US" sz="3600" dirty="0" smtClean="0">
-                <a:solidFill>
-                  <a:schemeClr val="tx2"/>
-                </a:solidFill>
-                <a:latin typeface="Yanone Kaffeesatz Regular" panose="02000000000000000000" pitchFamily="2" charset="0"/>
-              </a:rPr>
-              <a:t> responsible</a:t>
+              <a:t>Reading a book while doing</a:t>
             </a:r>
             <a:br>
-              <a:rPr lang="en-US" sz="3600" dirty="0" smtClean="0">
+              <a:rPr lang="en-US" sz="3600" dirty="0">
                 <a:solidFill>
                   <a:schemeClr val="tx2"/>
                 </a:solidFill>
@@ -5081,34 +6223,61 @@
               </a:rPr>
             </a:br>
             <a:r>
-              <a:rPr lang="en-US" sz="3600" dirty="0" smtClean="0">
+              <a:rPr lang="en-US" sz="3600" dirty="0">
                 <a:solidFill>
                   <a:schemeClr val="tx2"/>
                 </a:solidFill>
                 <a:latin typeface="Yanone Kaffeesatz Regular" panose="02000000000000000000" pitchFamily="2" charset="0"/>
               </a:rPr>
-              <a:t>for getting </a:t>
-            </a:r>
-            <a:r>
-              <a:rPr lang="en-US" sz="3600" dirty="0" smtClean="0">
-                <a:solidFill>
-                  <a:schemeClr val="accent4"/>
+              <a:t>the laundry</a:t>
+            </a:r>
+          </a:p>
+          <a:p>
+            <a:endParaRPr lang="en-US" sz="3600" dirty="0">
+              <a:solidFill>
+                <a:schemeClr val="tx2"/>
+              </a:solidFill>
+              <a:latin typeface="Yanone Kaffeesatz Regular" panose="02000000000000000000" pitchFamily="2" charset="0"/>
+            </a:endParaRPr>
+          </a:p>
+          <a:p>
+            <a:endParaRPr lang="en-US" sz="3600" dirty="0">
+              <a:solidFill>
+                <a:schemeClr val="tx2"/>
+              </a:solidFill>
+              <a:latin typeface="Yanone Kaffeesatz Regular" panose="02000000000000000000" pitchFamily="2" charset="0"/>
+            </a:endParaRPr>
+          </a:p>
+          <a:p>
+            <a:r>
+              <a:rPr lang="en-US" sz="3600" dirty="0">
+                <a:solidFill>
+                  <a:schemeClr val="tx2"/>
                 </a:solidFill>
                 <a:latin typeface="Yanone Kaffeesatz Regular" panose="02000000000000000000" pitchFamily="2" charset="0"/>
               </a:rPr>
-              <a:t>Task</a:t>
-            </a:r>
-            <a:r>
-              <a:rPr lang="en-US" sz="3600" dirty="0" smtClean="0">
-                <a:solidFill>
-                  <a:schemeClr val="tx2"/>
+              <a:t>Worker is </a:t>
+            </a:r>
+            <a:r>
+              <a:rPr lang="en-US" sz="3600" dirty="0">
+                <a:solidFill>
+                  <a:schemeClr val="accent4"/>
                 </a:solidFill>
                 <a:latin typeface="Yanone Kaffeesatz Regular" panose="02000000000000000000" pitchFamily="2" charset="0"/>
               </a:rPr>
-              <a:t>s done that are scheduled </a:t>
+              <a:t>free</a:t>
+            </a:r>
+            <a:r>
+              <a:rPr lang="en-US" sz="3600" dirty="0">
+                <a:solidFill>
+                  <a:schemeClr val="tx2"/>
+                </a:solidFill>
+                <a:latin typeface="Yanone Kaffeesatz Regular" panose="02000000000000000000" pitchFamily="2" charset="0"/>
+              </a:rPr>
+              <a:t> until signal</a:t>
             </a:r>
             <a:br>
-              <a:rPr lang="en-US" sz="3600" dirty="0" smtClean="0">
+              <a:rPr lang="en-US" sz="3600" dirty="0">
                 <a:solidFill>
                   <a:schemeClr val="tx2"/>
                 </a:solidFill>
@@ -5116,13 +6285,13 @@
               </a:rPr>
             </a:br>
             <a:r>
-              <a:rPr lang="en-US" sz="3600" dirty="0" smtClean="0">
+              <a:rPr lang="en-US" sz="3600" dirty="0">
                 <a:solidFill>
                   <a:schemeClr val="tx2"/>
                 </a:solidFill>
                 <a:latin typeface="Yanone Kaffeesatz Regular" panose="02000000000000000000" pitchFamily="2" charset="0"/>
               </a:rPr>
-              <a:t>in the task queue </a:t>
+              <a:t>indicates external task is done</a:t>
             </a:r>
           </a:p>
         </p:txBody>
@@ -5130,7 +6299,7 @@
     </p:spTree>
     <p:extLst>
       <p:ext uri="{BB962C8B-B14F-4D97-AF65-F5344CB8AC3E}">
-        <p14:creationId xmlns:p14="http://schemas.microsoft.com/office/powerpoint/2010/main" val="2787406615"/>
+        <p14:creationId xmlns:p14="http://schemas.microsoft.com/office/powerpoint/2010/main" val="3955367951"/>
       </p:ext>
     </p:extLst>
   </p:cSld>
@@ -5159,27 +6328,28 @@
       </p:grpSpPr>
       <p:sp>
         <p:nvSpPr>
-          <p:cNvPr id="2" name="Rectangle 1"/>
+          <p:cNvPr id="5" name="Rectangle 4"/>
           <p:cNvSpPr/>
           <p:nvPr/>
         </p:nvSpPr>
         <p:spPr>
           <a:xfrm>
-            <a:off x="1320870" y="1829327"/>
-            <a:ext cx="3276859" cy="2646878"/>
+            <a:off x="0" y="1952437"/>
+            <a:ext cx="4999912" cy="2646878"/>
           </a:xfrm>
           <a:prstGeom prst="rect">
             <a:avLst/>
           </a:prstGeom>
         </p:spPr>
         <p:txBody>
-          <a:bodyPr wrap="none">
+          <a:bodyPr wrap="square">
             <a:spAutoFit/>
           </a:bodyPr>
           <a:lstStyle/>
           <a:p>
-            <a:r>
-              <a:rPr lang="en-US" sz="16600" dirty="0" smtClean="0">
+            <a:pPr algn="ctr"/>
+            <a:r>
+              <a:rPr lang="en-US" sz="16600" dirty="0">
                 <a:solidFill>
                   <a:schemeClr val="accent2"/>
                 </a:solidFill>
@@ -5193,54 +6363,70 @@
       </p:sp>
       <p:sp>
         <p:nvSpPr>
-          <p:cNvPr id="3" name="Rectangle 2"/>
+          <p:cNvPr id="4" name="Rectangle 3"/>
           <p:cNvSpPr/>
           <p:nvPr/>
         </p:nvSpPr>
         <p:spPr>
-          <a:xfrm>
-            <a:off x="5222332" y="1998604"/>
-            <a:ext cx="6208751" cy="2308324"/>
+          <a:xfrm rot="16200000">
+            <a:off x="2324384" y="2828836"/>
+            <a:ext cx="6858000" cy="1200329"/>
           </a:xfrm>
           <a:prstGeom prst="rect">
             <a:avLst/>
           </a:prstGeom>
         </p:spPr>
         <p:txBody>
-          <a:bodyPr wrap="none">
+          <a:bodyPr wrap="square">
             <a:spAutoFit/>
           </a:bodyPr>
           <a:lstStyle/>
           <a:p>
-            <a:r>
-              <a:rPr lang="en-US" sz="3600" dirty="0" smtClean="0">
-                <a:solidFill>
-                  <a:schemeClr val="tx2"/>
+            <a:pPr algn="ctr"/>
+            <a:r>
+              <a:rPr lang="en-US" sz="7200" dirty="0">
+                <a:solidFill>
+                  <a:schemeClr val="accent3"/>
                 </a:solidFill>
                 <a:latin typeface="Yanone Kaffeesatz Regular" panose="02000000000000000000" pitchFamily="2" charset="0"/>
               </a:rPr>
-              <a:t>Scheduled</a:t>
-            </a:r>
-            <a:r>
-              <a:rPr lang="en-US" sz="3600" dirty="0" smtClean="0">
-                <a:solidFill>
-                  <a:schemeClr val="accent4"/>
+              <a:t>uniform</a:t>
+            </a:r>
+          </a:p>
+        </p:txBody>
+      </p:sp>
+      <p:sp>
+        <p:nvSpPr>
+          <p:cNvPr id="6" name="Rectangle 5"/>
+          <p:cNvSpPr/>
+          <p:nvPr/>
+        </p:nvSpPr>
+        <p:spPr>
+          <a:xfrm>
+            <a:off x="6485270" y="1671407"/>
+            <a:ext cx="5706729" cy="3970318"/>
+          </a:xfrm>
+          <a:prstGeom prst="rect">
+            <a:avLst/>
+          </a:prstGeom>
+        </p:spPr>
+        <p:txBody>
+          <a:bodyPr wrap="square">
+            <a:spAutoFit/>
+          </a:bodyPr>
+          <a:lstStyle/>
+          <a:p>
+            <a:r>
+              <a:rPr lang="en-US" sz="3600" dirty="0">
+                <a:solidFill>
+                  <a:schemeClr val="tx2"/>
                 </a:solidFill>
                 <a:latin typeface="Yanone Kaffeesatz Regular" panose="02000000000000000000" pitchFamily="2" charset="0"/>
               </a:rPr>
-              <a:t> Promise</a:t>
-            </a:r>
-            <a:r>
-              <a:rPr lang="en-US" sz="3600" dirty="0" smtClean="0">
-                <a:solidFill>
-                  <a:schemeClr val="tx2"/>
-                </a:solidFill>
-                <a:latin typeface="Yanone Kaffeesatz Regular" panose="02000000000000000000" pitchFamily="2" charset="0"/>
-              </a:rPr>
-              <a:t> which represents </a:t>
+              <a:t>The laundry machine in the previous</a:t>
             </a:r>
             <a:br>
-              <a:rPr lang="en-US" sz="3600" dirty="0" smtClean="0">
+              <a:rPr lang="en-US" sz="3600" dirty="0">
                 <a:solidFill>
                   <a:schemeClr val="tx2"/>
                 </a:solidFill>
@@ -5248,16 +6434,43 @@
               </a:rPr>
             </a:br>
             <a:r>
-              <a:rPr lang="en-US" sz="3600" dirty="0" smtClean="0">
+              <a:rPr lang="en-US" sz="3600" dirty="0">
                 <a:solidFill>
                   <a:schemeClr val="tx2"/>
                 </a:solidFill>
                 <a:latin typeface="Yanone Kaffeesatz Regular" panose="02000000000000000000" pitchFamily="2" charset="0"/>
               </a:rPr>
-              <a:t>the </a:t>
-            </a:r>
-            <a:r>
-              <a:rPr lang="en-US" sz="3600" dirty="0" smtClean="0">
+              <a:t>example represented an external task</a:t>
+            </a:r>
+          </a:p>
+          <a:p>
+            <a:endParaRPr lang="en-US" sz="3600" dirty="0">
+              <a:solidFill>
+                <a:schemeClr val="tx2"/>
+              </a:solidFill>
+              <a:latin typeface="Yanone Kaffeesatz Regular" panose="02000000000000000000" pitchFamily="2" charset="0"/>
+            </a:endParaRPr>
+          </a:p>
+          <a:p>
+            <a:endParaRPr lang="en-US" sz="3600" dirty="0">
+              <a:solidFill>
+                <a:schemeClr val="tx2"/>
+              </a:solidFill>
+              <a:latin typeface="Yanone Kaffeesatz Regular" panose="02000000000000000000" pitchFamily="2" charset="0"/>
+            </a:endParaRPr>
+          </a:p>
+          <a:p>
+            <a:r>
+              <a:rPr lang="en-US" sz="3600" dirty="0">
+                <a:solidFill>
+                  <a:schemeClr val="tx2"/>
+                </a:solidFill>
+                <a:latin typeface="Yanone Kaffeesatz Regular" panose="02000000000000000000" pitchFamily="2" charset="0"/>
+              </a:rPr>
+              <a:t>Represents the </a:t>
+            </a:r>
+            <a:r>
+              <a:rPr lang="en-US" sz="3600" dirty="0">
                 <a:solidFill>
                   <a:schemeClr val="accent4"/>
                 </a:solidFill>
@@ -5266,7 +6479,7 @@
               <a:t>state</a:t>
             </a:r>
             <a:r>
-              <a:rPr lang="en-US" sz="3600" dirty="0" smtClean="0">
+              <a:rPr lang="en-US" sz="3600" dirty="0">
                 <a:solidFill>
                   <a:schemeClr val="tx2"/>
                 </a:solidFill>
@@ -5275,7 +6488,7 @@
               <a:t> and </a:t>
             </a:r>
             <a:r>
-              <a:rPr lang="en-US" sz="3600" dirty="0" smtClean="0">
+              <a:rPr lang="en-US" sz="3600" dirty="0">
                 <a:solidFill>
                   <a:schemeClr val="accent4"/>
                 </a:solidFill>
@@ -5284,7 +6497,7 @@
               <a:t>outcome</a:t>
             </a:r>
             <a:r>
-              <a:rPr lang="en-US" sz="3600" dirty="0" smtClean="0">
+              <a:rPr lang="en-US" sz="3600" dirty="0">
                 <a:solidFill>
                   <a:schemeClr val="tx2"/>
                 </a:solidFill>
@@ -5293,7 +6506,7 @@
               <a:t> </a:t>
             </a:r>
             <a:br>
-              <a:rPr lang="en-US" sz="3600" dirty="0" smtClean="0">
+              <a:rPr lang="en-US" sz="3600" dirty="0">
                 <a:solidFill>
                   <a:schemeClr val="tx2"/>
                 </a:solidFill>
@@ -5301,31 +6514,47 @@
               </a:rPr>
             </a:br>
             <a:r>
-              <a:rPr lang="en-US" sz="3600" dirty="0" smtClean="0">
+              <a:rPr lang="en-US" sz="3600" dirty="0">
                 <a:solidFill>
                   <a:schemeClr val="tx2"/>
                 </a:solidFill>
                 <a:latin typeface="Yanone Kaffeesatz Regular" panose="02000000000000000000" pitchFamily="2" charset="0"/>
               </a:rPr>
-              <a:t>of an operation at any given time executed</a:t>
-            </a:r>
-            <a:br>
-              <a:rPr lang="en-US" sz="3600" dirty="0" smtClean="0">
-                <a:solidFill>
-                  <a:schemeClr val="tx2"/>
+              <a:t>of an asynchronous operation executed </a:t>
+            </a:r>
+            <a:r>
+              <a:rPr lang="en-US" sz="3600" dirty="0">
+                <a:solidFill>
+                  <a:schemeClr val="accent4"/>
                 </a:solidFill>
                 <a:latin typeface="Yanone Kaffeesatz Regular" panose="02000000000000000000" pitchFamily="2" charset="0"/>
               </a:rPr>
-            </a:br>
-            <a:r>
-              <a:rPr lang="en-US" sz="3600" dirty="0" smtClean="0">
-                <a:solidFill>
-                  <a:schemeClr val="accent4"/>
+              <a:t>now, later </a:t>
+            </a:r>
+            <a:r>
+              <a:rPr lang="en-US" sz="3600" dirty="0">
+                <a:solidFill>
+                  <a:schemeClr val="tx2"/>
                 </a:solidFill>
                 <a:latin typeface="Yanone Kaffeesatz Regular" panose="02000000000000000000" pitchFamily="2" charset="0"/>
               </a:rPr>
-              <a:t>now, later or never</a:t>
-            </a:r>
+              <a:t>or</a:t>
+            </a:r>
+            <a:r>
+              <a:rPr lang="en-US" sz="3600" dirty="0">
+                <a:solidFill>
+                  <a:schemeClr val="accent4"/>
+                </a:solidFill>
+                <a:latin typeface="Yanone Kaffeesatz Regular" panose="02000000000000000000" pitchFamily="2" charset="0"/>
+              </a:rPr>
+              <a:t> never</a:t>
+            </a:r>
+            <a:endParaRPr lang="en-US" sz="3600" dirty="0">
+              <a:solidFill>
+                <a:schemeClr val="tx2"/>
+              </a:solidFill>
+              <a:latin typeface="Yanone Kaffeesatz Regular" panose="02000000000000000000" pitchFamily="2" charset="0"/>
+            </a:endParaRPr>
           </a:p>
         </p:txBody>
       </p:sp>
@@ -5361,113 +6590,173 @@
       </p:grpSpPr>
       <p:sp>
         <p:nvSpPr>
-          <p:cNvPr id="2" name="Rectangle 1"/>
+          <p:cNvPr id="4" name="Rectangle 3"/>
           <p:cNvSpPr/>
           <p:nvPr/>
         </p:nvSpPr>
         <p:spPr>
-          <a:xfrm>
-            <a:off x="3575704" y="1050953"/>
-            <a:ext cx="6593472" cy="5386090"/>
+          <a:xfrm rot="16200000">
+            <a:off x="2324384" y="2828836"/>
+            <a:ext cx="6858000" cy="1200329"/>
           </a:xfrm>
           <a:prstGeom prst="rect">
             <a:avLst/>
           </a:prstGeom>
         </p:spPr>
         <p:txBody>
-          <a:bodyPr wrap="none">
+          <a:bodyPr wrap="square">
             <a:spAutoFit/>
           </a:bodyPr>
           <a:lstStyle/>
           <a:p>
-            <a:r>
-              <a:rPr lang="en-US" sz="34400" dirty="0" smtClean="0">
-                <a:solidFill>
-                  <a:schemeClr val="accent2"/>
+            <a:pPr algn="ctr"/>
+            <a:r>
+              <a:rPr lang="en-US" sz="7200" dirty="0">
+                <a:solidFill>
+                  <a:schemeClr val="accent3"/>
                 </a:solidFill>
                 <a:latin typeface="Yanone Kaffeesatz Regular" panose="02000000000000000000" pitchFamily="2" charset="0"/>
               </a:rPr>
-              <a:t>Task</a:t>
-            </a:r>
-            <a:endParaRPr lang="de-CH" sz="2400" dirty="0"/>
-          </a:p>
-        </p:txBody>
-      </p:sp>
-      <p:sp>
-        <p:nvSpPr>
-          <p:cNvPr id="4" name="Rectangle 3"/>
+              <a:t>physical</a:t>
+            </a:r>
+          </a:p>
+        </p:txBody>
+      </p:sp>
+      <p:sp>
+        <p:nvSpPr>
+          <p:cNvPr id="5" name="Rectangle 4"/>
           <p:cNvSpPr/>
           <p:nvPr/>
         </p:nvSpPr>
         <p:spPr>
           <a:xfrm>
-            <a:off x="5690867" y="2275603"/>
-            <a:ext cx="2204450" cy="646331"/>
+            <a:off x="0" y="1952437"/>
+            <a:ext cx="4999912" cy="2646878"/>
           </a:xfrm>
           <a:prstGeom prst="rect">
             <a:avLst/>
           </a:prstGeom>
         </p:spPr>
         <p:txBody>
-          <a:bodyPr wrap="none">
+          <a:bodyPr wrap="square">
             <a:spAutoFit/>
           </a:bodyPr>
           <a:lstStyle/>
           <a:p>
-            <a:r>
-              <a:rPr lang="en-US" sz="3600" dirty="0" smtClean="0">
-                <a:solidFill>
-                  <a:schemeClr val="accent3"/>
+            <a:pPr algn="ctr"/>
+            <a:r>
+              <a:rPr lang="en-US" sz="16600" dirty="0">
+                <a:solidFill>
+                  <a:schemeClr val="accent2"/>
                 </a:solidFill>
                 <a:latin typeface="Yanone Kaffeesatz Regular" panose="02000000000000000000" pitchFamily="2" charset="0"/>
               </a:rPr>
-              <a:t>Forget thread!</a:t>
-            </a:r>
-          </a:p>
-        </p:txBody>
-      </p:sp>
-      <p:sp>
-        <p:nvSpPr>
-          <p:cNvPr id="5" name="Rectangle 4"/>
+              <a:t>Thread</a:t>
+            </a:r>
+            <a:endParaRPr lang="de-CH" dirty="0"/>
+          </a:p>
+        </p:txBody>
+      </p:sp>
+      <p:sp>
+        <p:nvSpPr>
+          <p:cNvPr id="6" name="Rectangle 5"/>
           <p:cNvSpPr/>
           <p:nvPr/>
         </p:nvSpPr>
         <p:spPr>
           <a:xfrm>
-            <a:off x="710011" y="2538448"/>
-            <a:ext cx="3033203" cy="2215991"/>
+            <a:off x="6485270" y="1671407"/>
+            <a:ext cx="5706729" cy="2862322"/>
           </a:xfrm>
           <a:prstGeom prst="rect">
             <a:avLst/>
           </a:prstGeom>
         </p:spPr>
         <p:txBody>
-          <a:bodyPr wrap="none">
+          <a:bodyPr wrap="square">
             <a:spAutoFit/>
           </a:bodyPr>
           <a:lstStyle/>
           <a:p>
             <a:r>
-              <a:rPr lang="en-US" sz="13800" dirty="0" smtClean="0">
+              <a:rPr lang="en-US" sz="3600" dirty="0">
                 <a:solidFill>
                   <a:schemeClr val="tx2"/>
                 </a:solidFill>
                 <a:latin typeface="Yanone Kaffeesatz Regular" panose="02000000000000000000" pitchFamily="2" charset="0"/>
               </a:rPr>
-              <a:t>think</a:t>
-            </a:r>
-            <a:endParaRPr lang="de-CH" sz="1600" dirty="0">
+              <a:t>Me doing the laundry by hand like in medieval times</a:t>
+            </a:r>
+          </a:p>
+          <a:p>
+            <a:endParaRPr lang="en-US" sz="3600" dirty="0">
               <a:solidFill>
                 <a:schemeClr val="tx2"/>
               </a:solidFill>
+              <a:latin typeface="Yanone Kaffeesatz Regular" panose="02000000000000000000" pitchFamily="2" charset="0"/>
             </a:endParaRPr>
+          </a:p>
+          <a:p>
+            <a:r>
+              <a:rPr lang="en-US" sz="3600" dirty="0">
+                <a:solidFill>
+                  <a:schemeClr val="tx2"/>
+                </a:solidFill>
+                <a:latin typeface="Yanone Kaffeesatz Regular" panose="02000000000000000000" pitchFamily="2" charset="0"/>
+              </a:rPr>
+              <a:t>A </a:t>
+            </a:r>
+            <a:r>
+              <a:rPr lang="en-US" sz="3600" dirty="0">
+                <a:solidFill>
+                  <a:schemeClr val="accent4"/>
+                </a:solidFill>
+                <a:latin typeface="Yanone Kaffeesatz Regular" panose="02000000000000000000" pitchFamily="2" charset="0"/>
+              </a:rPr>
+              <a:t>worker</a:t>
+            </a:r>
+            <a:r>
+              <a:rPr lang="en-US" sz="3600" dirty="0">
+                <a:solidFill>
+                  <a:schemeClr val="tx2"/>
+                </a:solidFill>
+                <a:latin typeface="Yanone Kaffeesatz Regular" panose="02000000000000000000" pitchFamily="2" charset="0"/>
+              </a:rPr>
+              <a:t> responsible for getting </a:t>
+            </a:r>
+            <a:br>
+              <a:rPr lang="en-US" sz="3600" dirty="0">
+                <a:solidFill>
+                  <a:schemeClr val="tx2"/>
+                </a:solidFill>
+                <a:latin typeface="Yanone Kaffeesatz Regular" panose="02000000000000000000" pitchFamily="2" charset="0"/>
+              </a:rPr>
+            </a:br>
+            <a:r>
+              <a:rPr lang="en-US" sz="3600" dirty="0">
+                <a:solidFill>
+                  <a:schemeClr val="accent4"/>
+                </a:solidFill>
+                <a:latin typeface="Yanone Kaffeesatz Regular" panose="02000000000000000000" pitchFamily="2" charset="0"/>
+              </a:rPr>
+              <a:t>Task</a:t>
+            </a:r>
+            <a:r>
+              <a:rPr lang="en-US" sz="3600" dirty="0">
+                <a:solidFill>
+                  <a:schemeClr val="tx2"/>
+                </a:solidFill>
+                <a:latin typeface="Yanone Kaffeesatz Regular" panose="02000000000000000000" pitchFamily="2" charset="0"/>
+              </a:rPr>
+              <a:t>s done that are scheduled</a:t>
+            </a:r>
           </a:p>
         </p:txBody>
       </p:sp>
     </p:spTree>
     <p:extLst>
       <p:ext uri="{BB962C8B-B14F-4D97-AF65-F5344CB8AC3E}">
-        <p14:creationId xmlns:p14="http://schemas.microsoft.com/office/powerpoint/2010/main" val="3280424302"/>
+        <p14:creationId xmlns:p14="http://schemas.microsoft.com/office/powerpoint/2010/main" val="2787406615"/>
       </p:ext>
     </p:extLst>
   </p:cSld>
@@ -5494,147 +6783,130 @@
           <a:chExt cx="0" cy="0"/>
         </a:xfrm>
       </p:grpSpPr>
-      <p:sp>
-        <p:nvSpPr>
-          <p:cNvPr id="2" name="Rectangle 1"/>
-          <p:cNvSpPr/>
+      <p:grpSp>
+        <p:nvGrpSpPr>
+          <p:cNvPr id="3" name="Group 2"/>
+          <p:cNvGrpSpPr/>
           <p:nvPr/>
-        </p:nvSpPr>
-        <p:spPr>
+        </p:nvGrpSpPr>
+        <p:grpSpPr>
           <a:xfrm>
-            <a:off x="1298199" y="1315449"/>
-            <a:ext cx="9881231" cy="3154710"/>
+            <a:off x="1366418" y="735955"/>
+            <a:ext cx="9459165" cy="5386090"/>
+            <a:chOff x="710011" y="1050953"/>
+            <a:chExt cx="9459165" cy="5386090"/>
           </a:xfrm>
-          <a:prstGeom prst="rect">
-            <a:avLst/>
-          </a:prstGeom>
-        </p:spPr>
-        <p:txBody>
-          <a:bodyPr wrap="none">
-            <a:spAutoFit/>
-          </a:bodyPr>
-          <a:lstStyle/>
-          <a:p>
-            <a:r>
-              <a:rPr lang="en-US" sz="19900" dirty="0" err="1">
-                <a:solidFill>
-                  <a:schemeClr val="accent2"/>
-                </a:solidFill>
-                <a:latin typeface="Yanone Kaffeesatz Regular" panose="02000000000000000000" pitchFamily="2" charset="0"/>
-              </a:rPr>
-              <a:t>a</a:t>
-            </a:r>
-            <a:r>
-              <a:rPr lang="en-US" sz="19900" dirty="0" err="1" smtClean="0">
-                <a:solidFill>
-                  <a:schemeClr val="accent2"/>
-                </a:solidFill>
-                <a:latin typeface="Yanone Kaffeesatz Regular" panose="02000000000000000000" pitchFamily="2" charset="0"/>
-              </a:rPr>
-              <a:t>sync</a:t>
-            </a:r>
-            <a:r>
-              <a:rPr lang="en-US" sz="19900" dirty="0" smtClean="0">
-                <a:solidFill>
-                  <a:schemeClr val="accent2"/>
-                </a:solidFill>
-                <a:latin typeface="Yanone Kaffeesatz Regular" panose="02000000000000000000" pitchFamily="2" charset="0"/>
-              </a:rPr>
-              <a:t>/await</a:t>
-            </a:r>
-            <a:endParaRPr lang="de-CH" sz="2000" dirty="0"/>
-          </a:p>
-        </p:txBody>
-      </p:sp>
-      <p:sp>
-        <p:nvSpPr>
-          <p:cNvPr id="3" name="Rectangle 2"/>
-          <p:cNvSpPr/>
-          <p:nvPr/>
-        </p:nvSpPr>
-        <p:spPr>
-          <a:xfrm>
-            <a:off x="6483462" y="4128445"/>
-            <a:ext cx="4544834" cy="1200329"/>
-          </a:xfrm>
-          <a:prstGeom prst="rect">
-            <a:avLst/>
-          </a:prstGeom>
-        </p:spPr>
-        <p:txBody>
-          <a:bodyPr wrap="none">
-            <a:spAutoFit/>
-          </a:bodyPr>
-          <a:lstStyle/>
-          <a:p>
-            <a:r>
-              <a:rPr lang="en-US" sz="7200" dirty="0" smtClean="0">
+        </p:grpSpPr>
+        <p:sp>
+          <p:nvSpPr>
+            <p:cNvPr id="2" name="Rectangle 1"/>
+            <p:cNvSpPr/>
+            <p:nvPr/>
+          </p:nvSpPr>
+          <p:spPr>
+            <a:xfrm>
+              <a:off x="3575704" y="1050953"/>
+              <a:ext cx="6593472" cy="5386090"/>
+            </a:xfrm>
+            <a:prstGeom prst="rect">
+              <a:avLst/>
+            </a:prstGeom>
+          </p:spPr>
+          <p:txBody>
+            <a:bodyPr wrap="none">
+              <a:spAutoFit/>
+            </a:bodyPr>
+            <a:lstStyle/>
+            <a:p>
+              <a:r>
+                <a:rPr lang="en-US" sz="34400" dirty="0">
+                  <a:solidFill>
+                    <a:schemeClr val="accent2"/>
+                  </a:solidFill>
+                  <a:latin typeface="Yanone Kaffeesatz Regular" panose="02000000000000000000" pitchFamily="2" charset="0"/>
+                </a:rPr>
+                <a:t>Task</a:t>
+              </a:r>
+              <a:endParaRPr lang="de-CH" sz="2400" dirty="0"/>
+            </a:p>
+          </p:txBody>
+        </p:sp>
+        <p:sp>
+          <p:nvSpPr>
+            <p:cNvPr id="4" name="Rectangle 3"/>
+            <p:cNvSpPr/>
+            <p:nvPr/>
+          </p:nvSpPr>
+          <p:spPr>
+            <a:xfrm>
+              <a:off x="1040633" y="1987168"/>
+              <a:ext cx="2204450" cy="646331"/>
+            </a:xfrm>
+            <a:prstGeom prst="rect">
+              <a:avLst/>
+            </a:prstGeom>
+          </p:spPr>
+          <p:txBody>
+            <a:bodyPr wrap="none">
+              <a:spAutoFit/>
+            </a:bodyPr>
+            <a:lstStyle/>
+            <a:p>
+              <a:r>
+                <a:rPr lang="en-US" sz="3600" dirty="0">
+                  <a:solidFill>
+                    <a:schemeClr val="accent3"/>
+                  </a:solidFill>
+                  <a:latin typeface="Yanone Kaffeesatz Regular" panose="02000000000000000000" pitchFamily="2" charset="0"/>
+                </a:rPr>
+                <a:t>Forget thread!</a:t>
+              </a:r>
+            </a:p>
+          </p:txBody>
+        </p:sp>
+        <p:sp>
+          <p:nvSpPr>
+            <p:cNvPr id="5" name="Rectangle 4"/>
+            <p:cNvSpPr/>
+            <p:nvPr/>
+          </p:nvSpPr>
+          <p:spPr>
+            <a:xfrm>
+              <a:off x="710011" y="2538448"/>
+              <a:ext cx="3033203" cy="2215991"/>
+            </a:xfrm>
+            <a:prstGeom prst="rect">
+              <a:avLst/>
+            </a:prstGeom>
+          </p:spPr>
+          <p:txBody>
+            <a:bodyPr wrap="none">
+              <a:spAutoFit/>
+            </a:bodyPr>
+            <a:lstStyle/>
+            <a:p>
+              <a:r>
+                <a:rPr lang="en-US" sz="13800" dirty="0">
+                  <a:solidFill>
+                    <a:schemeClr val="tx2"/>
+                  </a:solidFill>
+                  <a:latin typeface="Yanone Kaffeesatz Regular" panose="02000000000000000000" pitchFamily="2" charset="0"/>
+                </a:rPr>
+                <a:t>think</a:t>
+              </a:r>
+              <a:endParaRPr lang="de-CH" sz="1600" dirty="0">
                 <a:solidFill>
                   <a:schemeClr val="tx2"/>
                 </a:solidFill>
-                <a:latin typeface="Yanone Kaffeesatz Regular" panose="02000000000000000000" pitchFamily="2" charset="0"/>
-              </a:rPr>
-              <a:t>syntactic sugar</a:t>
-            </a:r>
-            <a:endParaRPr lang="de-CH" sz="7200" dirty="0">
-              <a:solidFill>
-                <a:schemeClr val="tx2"/>
-              </a:solidFill>
-            </a:endParaRPr>
-          </a:p>
-        </p:txBody>
-      </p:sp>
-      <p:sp>
-        <p:nvSpPr>
-          <p:cNvPr id="4" name="Rectangle 3"/>
-          <p:cNvSpPr/>
-          <p:nvPr/>
-        </p:nvSpPr>
-        <p:spPr>
-          <a:xfrm>
-            <a:off x="8754879" y="4929550"/>
-            <a:ext cx="2501006" cy="584775"/>
-          </a:xfrm>
-          <a:prstGeom prst="rect">
-            <a:avLst/>
-          </a:prstGeom>
-        </p:spPr>
-        <p:txBody>
-          <a:bodyPr wrap="none">
-            <a:spAutoFit/>
-          </a:bodyPr>
-          <a:lstStyle/>
-          <a:p>
-            <a:r>
-              <a:rPr lang="en-US" sz="3200" dirty="0" smtClean="0">
-                <a:solidFill>
-                  <a:schemeClr val="accent4"/>
-                </a:solidFill>
-                <a:latin typeface="Yanone Kaffeesatz Regular" panose="02000000000000000000" pitchFamily="2" charset="0"/>
-              </a:rPr>
-              <a:t>compiler        </a:t>
-            </a:r>
-            <a:r>
-              <a:rPr lang="en-US" sz="3200" dirty="0" smtClean="0">
-                <a:solidFill>
-                  <a:schemeClr val="accent4"/>
-                </a:solidFill>
-                <a:latin typeface="Yanone Kaffeesatz Regular" panose="02000000000000000000" pitchFamily="2" charset="0"/>
-              </a:rPr>
-              <a:t>magic</a:t>
-            </a:r>
-            <a:endParaRPr lang="de-CH" sz="3200" dirty="0">
-              <a:solidFill>
-                <a:schemeClr val="accent4"/>
-              </a:solidFill>
-            </a:endParaRPr>
-          </a:p>
-        </p:txBody>
-      </p:sp>
+              </a:endParaRPr>
+            </a:p>
+          </p:txBody>
+        </p:sp>
+      </p:grpSp>
     </p:spTree>
     <p:extLst>
       <p:ext uri="{BB962C8B-B14F-4D97-AF65-F5344CB8AC3E}">
-        <p14:creationId xmlns:p14="http://schemas.microsoft.com/office/powerpoint/2010/main" val="4052507699"/>
+        <p14:creationId xmlns:p14="http://schemas.microsoft.com/office/powerpoint/2010/main" val="3280424302"/>
       </p:ext>
     </p:extLst>
   </p:cSld>
@@ -5683,7 +6955,7 @@
           <a:lstStyle/>
           <a:p>
             <a:r>
-              <a:rPr lang="en-US" sz="16600" dirty="0" smtClean="0">
+              <a:rPr lang="en-US" sz="16600" dirty="0">
                 <a:solidFill>
                   <a:schemeClr val="accent2"/>
                 </a:solidFill>
@@ -5717,7 +6989,7 @@
           <a:lstStyle/>
           <a:p>
             <a:r>
-              <a:rPr lang="en-US" sz="3600" dirty="0" smtClean="0">
+              <a:rPr lang="en-US" sz="3600" dirty="0">
                 <a:solidFill>
                   <a:schemeClr val="tx2"/>
                 </a:solidFill>
@@ -5725,7 +6997,7 @@
               </a:rPr>
               <a:t>A function that is scheduled for execution</a:t>
             </a:r>
-            <a:endParaRPr lang="en-US" sz="3600" dirty="0" smtClean="0">
+            <a:endParaRPr lang="en-US" sz="3600" dirty="0">
               <a:solidFill>
                 <a:schemeClr val="accent4"/>
               </a:solidFill>
@@ -5743,7 +7015,7 @@
         <p:spPr>
           <a:xfrm>
             <a:off x="3952626" y="4476205"/>
-            <a:ext cx="6381875" cy="646331"/>
+            <a:ext cx="6686446" cy="646331"/>
           </a:xfrm>
           <a:prstGeom prst="rect">
             <a:avLst/>
@@ -5762,7 +7034,7 @@
                 </a:solidFill>
                 <a:latin typeface="Yanone Kaffeesatz Regular" panose="02000000000000000000" pitchFamily="2" charset="0"/>
               </a:rPr>
-              <a:t>after its antecedent function has completed</a:t>
+              <a:t>after its prerequisite function has completed</a:t>
             </a:r>
             <a:endParaRPr lang="en-US" sz="3600" dirty="0">
               <a:solidFill>
@@ -5825,7 +7097,7 @@
           <a:lstStyle/>
           <a:p>
             <a:r>
-              <a:rPr lang="en-US" sz="8000" dirty="0" err="1" smtClean="0">
+              <a:rPr lang="en-US" sz="8000" dirty="0" err="1">
                 <a:solidFill>
                   <a:schemeClr val="tx2"/>
                 </a:solidFill>
@@ -5834,7 +7106,7 @@
               <a:t>task.ContinueWith</a:t>
             </a:r>
             <a:r>
-              <a:rPr lang="en-US" sz="8000" dirty="0" smtClean="0">
+              <a:rPr lang="en-US" sz="8000" dirty="0">
                 <a:solidFill>
                   <a:schemeClr val="tx2"/>
                 </a:solidFill>
@@ -5845,7 +7117,7 @@
           </a:p>
           <a:p>
             <a:r>
-              <a:rPr lang="en-US" sz="8000" dirty="0" smtClean="0">
+              <a:rPr lang="en-US" sz="8000" dirty="0">
                 <a:solidFill>
                   <a:schemeClr val="tx2"/>
                 </a:solidFill>
@@ -5854,7 +7126,7 @@
               <a:t>   </a:t>
             </a:r>
             <a:r>
-              <a:rPr lang="en-US" sz="8000" dirty="0" smtClean="0">
+              <a:rPr lang="en-US" sz="8000" dirty="0">
                 <a:solidFill>
                   <a:schemeClr val="accent4"/>
                 </a:solidFill>
@@ -5863,7 +7135,7 @@
               <a:t>continuation</a:t>
             </a:r>
             <a:r>
-              <a:rPr lang="en-US" sz="8000" dirty="0" smtClean="0">
+              <a:rPr lang="en-US" sz="8000" dirty="0">
                 <a:solidFill>
                   <a:schemeClr val="tx2"/>
                 </a:solidFill>
@@ -5871,16 +7143,10 @@
               </a:rPr>
               <a:t>;</a:t>
             </a:r>
-            <a:endParaRPr lang="en-US" sz="8000" dirty="0">
-              <a:solidFill>
-                <a:schemeClr val="tx2"/>
-              </a:solidFill>
-              <a:latin typeface="Yanone Kaffeesatz Regular" panose="02000000000000000000" pitchFamily="2" charset="0"/>
-            </a:endParaRPr>
-          </a:p>
-          <a:p>
-            <a:r>
-              <a:rPr lang="en-US" sz="8000" dirty="0" smtClean="0">
+          </a:p>
+          <a:p>
+            <a:r>
+              <a:rPr lang="en-US" sz="8000" dirty="0">
                 <a:solidFill>
                   <a:schemeClr val="tx2"/>
                 </a:solidFill>

</xml_diff>

<commit_message>
Small corrections on slides
</commit_message>
<xml_diff>
--- a/webinar.pptx
+++ b/webinar.pptx
@@ -5,7 +5,7 @@
     <p:sldMasterId id="2147483684" r:id="rId1"/>
   </p:sldMasterIdLst>
   <p:notesMasterIdLst>
-    <p:notesMasterId r:id="rId22"/>
+    <p:notesMasterId r:id="rId23"/>
   </p:notesMasterIdLst>
   <p:sldIdLst>
     <p:sldId id="278" r:id="rId2"/>
@@ -28,6 +28,7 @@
     <p:sldId id="267" r:id="rId19"/>
     <p:sldId id="276" r:id="rId20"/>
     <p:sldId id="275" r:id="rId21"/>
+    <p:sldId id="279" r:id="rId22"/>
   </p:sldIdLst>
   <p:sldSz cx="12192000" cy="6858000"/>
   <p:notesSz cx="6858000" cy="9144000"/>
@@ -1240,6 +1241,10 @@
           <a:bodyPr/>
           <a:lstStyle/>
           <a:p>
+            <a:r>
+              <a:rPr lang="en-US" dirty="0"/>
+              <a:t>Explain what’s next</a:t>
+            </a:r>
             <a:endParaRPr lang="de-CH" dirty="0"/>
           </a:p>
         </p:txBody>
@@ -1372,6 +1377,98 @@
 </p:notes>
 </file>
 
+<file path=ppt/notesSlides/notesSlide19.xml><?xml version="1.0" encoding="utf-8"?>
+<p:notes xmlns:a="http://schemas.openxmlformats.org/drawingml/2006/main" xmlns:r="http://schemas.openxmlformats.org/officeDocument/2006/relationships" xmlns:p="http://schemas.openxmlformats.org/presentationml/2006/main">
+  <p:cSld>
+    <p:spTree>
+      <p:nvGrpSpPr>
+        <p:cNvPr id="1" name=""/>
+        <p:cNvGrpSpPr/>
+        <p:nvPr/>
+      </p:nvGrpSpPr>
+      <p:grpSpPr>
+        <a:xfrm>
+          <a:off x="0" y="0"/>
+          <a:ext cx="0" cy="0"/>
+          <a:chOff x="0" y="0"/>
+          <a:chExt cx="0" cy="0"/>
+        </a:xfrm>
+      </p:grpSpPr>
+      <p:sp>
+        <p:nvSpPr>
+          <p:cNvPr id="2" name="Slide Image Placeholder 1"/>
+          <p:cNvSpPr>
+            <a:spLocks noGrp="1" noRot="1" noChangeAspect="1"/>
+          </p:cNvSpPr>
+          <p:nvPr>
+            <p:ph type="sldImg"/>
+          </p:nvPr>
+        </p:nvSpPr>
+        <p:spPr/>
+      </p:sp>
+      <p:sp>
+        <p:nvSpPr>
+          <p:cNvPr id="3" name="Notes Placeholder 2"/>
+          <p:cNvSpPr>
+            <a:spLocks noGrp="1"/>
+          </p:cNvSpPr>
+          <p:nvPr>
+            <p:ph type="body" idx="1"/>
+          </p:nvPr>
+        </p:nvSpPr>
+        <p:spPr/>
+        <p:txBody>
+          <a:bodyPr/>
+          <a:lstStyle/>
+          <a:p>
+            <a:r>
+              <a:rPr lang="de-CH" dirty="0"/>
+              <a:t>Reduces christmas tree programming to code</a:t>
+            </a:r>
+            <a:r>
+              <a:rPr lang="de-CH" baseline="0" dirty="0"/>
+              <a:t> which looks much</a:t>
+            </a:r>
+            <a:endParaRPr lang="de-CH" dirty="0"/>
+          </a:p>
+        </p:txBody>
+      </p:sp>
+      <p:sp>
+        <p:nvSpPr>
+          <p:cNvPr id="4" name="Slide Number Placeholder 3"/>
+          <p:cNvSpPr>
+            <a:spLocks noGrp="1"/>
+          </p:cNvSpPr>
+          <p:nvPr>
+            <p:ph type="sldNum" sz="quarter" idx="10"/>
+          </p:nvPr>
+        </p:nvSpPr>
+        <p:spPr/>
+        <p:txBody>
+          <a:bodyPr/>
+          <a:lstStyle/>
+          <a:p>
+            <a:fld id="{9BCA07FD-5BD5-4529-84B0-48DD2C561176}" type="slidenum">
+              <a:rPr lang="de-CH" smtClean="0"/>
+              <a:t>21</a:t>
+            </a:fld>
+            <a:endParaRPr lang="de-CH"/>
+          </a:p>
+        </p:txBody>
+      </p:sp>
+    </p:spTree>
+    <p:extLst>
+      <p:ext uri="{BB962C8B-B14F-4D97-AF65-F5344CB8AC3E}">
+        <p14:creationId xmlns:p14="http://schemas.microsoft.com/office/powerpoint/2010/main" val="3949593976"/>
+      </p:ext>
+    </p:extLst>
+  </p:cSld>
+  <p:clrMapOvr>
+    <a:masterClrMapping/>
+  </p:clrMapOvr>
+</p:notes>
+</file>
+
 <file path=ppt/notesSlides/notesSlide2.xml><?xml version="1.0" encoding="utf-8"?>
 <p:notes xmlns:a="http://schemas.openxmlformats.org/drawingml/2006/main" xmlns:r="http://schemas.openxmlformats.org/officeDocument/2006/relationships" xmlns:p="http://schemas.openxmlformats.org/presentationml/2006/main">
   <p:cSld>
@@ -1850,7 +1947,25 @@
           <a:p>
             <a:r>
               <a:rPr lang="en-US" baseline="0" dirty="0"/>
-              <a:t>Tie back to laundry machine</a:t>
+              <a:t>So the state of the task representing the laundry machine would be running, not running, completed</a:t>
+            </a:r>
+          </a:p>
+          <a:p>
+            <a:r>
+              <a:rPr lang="en-US" baseline="0" dirty="0"/>
+              <a:t>The outcome should be clean clothes</a:t>
+            </a:r>
+          </a:p>
+          <a:p>
+            <a:r>
+              <a:rPr lang="en-US" baseline="0" dirty="0"/>
+              <a:t>I can late start the machine with a timer, or the machine can decide to run a health check before the process starts</a:t>
+            </a:r>
+          </a:p>
+          <a:p>
+            <a:r>
+              <a:rPr lang="en-US" baseline="0" dirty="0"/>
+              <a:t>It is also possible that because of failures the machine never starts or my wife cancels the process while I’m reading my book because yet again I’ve chosen the wrong temperature</a:t>
             </a:r>
             <a:endParaRPr lang="de-CH" dirty="0"/>
           </a:p>
@@ -6288,7 +6403,7 @@
                 </a:solidFill>
                 <a:latin typeface="Yanone Kaffeesatz Regular" panose="02000000000000000000" pitchFamily="2" charset="0"/>
               </a:rPr>
-              <a:t>In libraries and frameworks use </a:t>
+              <a:t>Libraries and frameworks should use </a:t>
             </a:r>
             <a:r>
               <a:rPr lang="en-US" sz="3600" dirty="0" err="1">
@@ -6553,13 +6668,13 @@
           <a:p>
             <a:pPr algn="ctr"/>
             <a:r>
-              <a:rPr lang="en-US" sz="16600" dirty="0" err="1">
+              <a:rPr lang="en-US" sz="16600" dirty="0">
                 <a:solidFill>
                   <a:schemeClr val="accent2"/>
                 </a:solidFill>
                 <a:latin typeface="Yanone Kaffeesatz Regular" panose="02000000000000000000" pitchFamily="2" charset="0"/>
               </a:rPr>
-              <a:t>SignUp</a:t>
+              <a:t>Next</a:t>
             </a:r>
             <a:endParaRPr lang="de-CH" dirty="0"/>
           </a:p>
@@ -6902,6 +7017,70 @@
 </p:sld>
 </file>
 
+<file path=ppt/slides/slide21.xml><?xml version="1.0" encoding="utf-8"?>
+<p:sld xmlns:a="http://schemas.openxmlformats.org/drawingml/2006/main" xmlns:r="http://schemas.openxmlformats.org/officeDocument/2006/relationships" xmlns:p="http://schemas.openxmlformats.org/presentationml/2006/main">
+  <p:cSld>
+    <p:spTree>
+      <p:nvGrpSpPr>
+        <p:cNvPr id="1" name=""/>
+        <p:cNvGrpSpPr/>
+        <p:nvPr/>
+      </p:nvGrpSpPr>
+      <p:grpSpPr>
+        <a:xfrm>
+          <a:off x="0" y="0"/>
+          <a:ext cx="0" cy="0"/>
+          <a:chOff x="0" y="0"/>
+          <a:chExt cx="0" cy="0"/>
+        </a:xfrm>
+      </p:grpSpPr>
+      <p:sp>
+        <p:nvSpPr>
+          <p:cNvPr id="2" name="Rectangle 1"/>
+          <p:cNvSpPr/>
+          <p:nvPr/>
+        </p:nvSpPr>
+        <p:spPr>
+          <a:xfrm>
+            <a:off x="3176771" y="1851645"/>
+            <a:ext cx="5838458" cy="3154710"/>
+          </a:xfrm>
+          <a:prstGeom prst="rect">
+            <a:avLst/>
+          </a:prstGeom>
+        </p:spPr>
+        <p:txBody>
+          <a:bodyPr wrap="none">
+            <a:spAutoFit/>
+          </a:bodyPr>
+          <a:lstStyle/>
+          <a:p>
+            <a:r>
+              <a:rPr lang="en-US" sz="19900" dirty="0">
+                <a:solidFill>
+                  <a:schemeClr val="accent2"/>
+                </a:solidFill>
+                <a:latin typeface="Yanone Kaffeesatz Regular" panose="02000000000000000000" pitchFamily="2" charset="0"/>
+              </a:rPr>
+              <a:t>Thanks</a:t>
+            </a:r>
+            <a:endParaRPr lang="de-CH" sz="2000" dirty="0"/>
+          </a:p>
+        </p:txBody>
+      </p:sp>
+    </p:spTree>
+    <p:extLst>
+      <p:ext uri="{BB962C8B-B14F-4D97-AF65-F5344CB8AC3E}">
+        <p14:creationId xmlns:p14="http://schemas.microsoft.com/office/powerpoint/2010/main" val="3887468163"/>
+      </p:ext>
+    </p:extLst>
+  </p:cSld>
+  <p:clrMapOvr>
+    <a:masterClrMapping/>
+  </p:clrMapOvr>
+</p:sld>
+</file>
+
 <file path=ppt/slides/slide3.xml><?xml version="1.0" encoding="utf-8"?>
 <p:sld xmlns:a="http://schemas.openxmlformats.org/drawingml/2006/main" xmlns:r="http://schemas.openxmlformats.org/officeDocument/2006/relationships" xmlns:p="http://schemas.openxmlformats.org/presentationml/2006/main">
   <p:cSld>
@@ -6997,7 +7176,7 @@
         <p:spPr>
           <a:xfrm>
             <a:off x="6485270" y="1671407"/>
-            <a:ext cx="5706729" cy="2862322"/>
+            <a:ext cx="5706729" cy="3970318"/>
           </a:xfrm>
           <a:prstGeom prst="rect">
             <a:avLst/>
@@ -7009,6 +7188,31 @@
           </a:bodyPr>
           <a:lstStyle/>
           <a:p>
+            <a:r>
+              <a:rPr lang="en-US" sz="3600" dirty="0">
+                <a:solidFill>
+                  <a:schemeClr val="accent4"/>
+                </a:solidFill>
+                <a:latin typeface="Yanone Kaffeesatz Regular" panose="02000000000000000000" pitchFamily="2" charset="0"/>
+              </a:rPr>
+              <a:t>Terminologies</a:t>
+            </a:r>
+            <a:br>
+              <a:rPr lang="en-US" sz="3600" dirty="0">
+                <a:solidFill>
+                  <a:schemeClr val="accent4"/>
+                </a:solidFill>
+                <a:latin typeface="Yanone Kaffeesatz Regular" panose="02000000000000000000" pitchFamily="2" charset="0"/>
+              </a:rPr>
+            </a:br>
+            <a:br>
+              <a:rPr lang="en-US" sz="3600" dirty="0">
+                <a:solidFill>
+                  <a:schemeClr val="accent4"/>
+                </a:solidFill>
+                <a:latin typeface="Yanone Kaffeesatz Regular" panose="02000000000000000000" pitchFamily="2" charset="0"/>
+              </a:rPr>
+            </a:br>
             <a:r>
               <a:rPr lang="en-US" sz="3600" dirty="0">
                 <a:solidFill>

</xml_diff>